<commit_message>
wow bugs are hard
</commit_message>
<xml_diff>
--- a/slide/slides.pptx
+++ b/slide/slides.pptx
@@ -8,14 +8,14 @@
     <p:sldId id="256" r:id="rId2"/>
     <p:sldId id="257" r:id="rId3"/>
     <p:sldId id="262" r:id="rId4"/>
-    <p:sldId id="263" r:id="rId5"/>
-    <p:sldId id="264" r:id="rId6"/>
-    <p:sldId id="265" r:id="rId7"/>
-    <p:sldId id="266" r:id="rId8"/>
-    <p:sldId id="258" r:id="rId9"/>
-    <p:sldId id="259" r:id="rId10"/>
-    <p:sldId id="261" r:id="rId11"/>
-    <p:sldId id="260" r:id="rId12"/>
+    <p:sldId id="267" r:id="rId5"/>
+    <p:sldId id="263" r:id="rId6"/>
+    <p:sldId id="264" r:id="rId7"/>
+    <p:sldId id="265" r:id="rId8"/>
+    <p:sldId id="266" r:id="rId9"/>
+    <p:sldId id="258" r:id="rId10"/>
+    <p:sldId id="259" r:id="rId11"/>
+    <p:sldId id="261" r:id="rId12"/>
   </p:sldIdLst>
   <p:sldSz cx="12192000" cy="6858000"/>
   <p:notesSz cx="6858000" cy="9144000"/>
@@ -5473,7 +5473,7 @@
           <p:cNvPr id="2" name="Title 1">
             <a:extLst>
               <a:ext uri="{FF2B5EF4-FFF2-40B4-BE49-F238E27FC236}">
-                <a16:creationId xmlns:a16="http://schemas.microsoft.com/office/drawing/2014/main" id="{7D90C493-C170-442D-9154-AB1D6BA5392D}"/>
+                <a16:creationId xmlns:a16="http://schemas.microsoft.com/office/drawing/2014/main" id="{B0CFB2A9-782A-4580-BC98-13BC1976EDD1}"/>
               </a:ext>
             </a:extLst>
           </p:cNvPr>
@@ -5491,7 +5491,7 @@
           <a:p>
             <a:r>
               <a:rPr lang="en-US" dirty="0"/>
-              <a:t>Going forward</a:t>
+              <a:t>Results</a:t>
             </a:r>
           </a:p>
         </p:txBody>
@@ -5501,7 +5501,7 @@
           <p:cNvPr id="3" name="Content Placeholder 2">
             <a:extLst>
               <a:ext uri="{FF2B5EF4-FFF2-40B4-BE49-F238E27FC236}">
-                <a16:creationId xmlns:a16="http://schemas.microsoft.com/office/drawing/2014/main" id="{84EABE29-C074-40A6-9A4C-F3D3D55BE5B0}"/>
+                <a16:creationId xmlns:a16="http://schemas.microsoft.com/office/drawing/2014/main" id="{A36212B8-B021-4872-B27E-86C4647A9FF1}"/>
               </a:ext>
             </a:extLst>
           </p:cNvPr>
@@ -5524,7 +5524,7 @@
     </p:spTree>
     <p:extLst>
       <p:ext uri="{BB962C8B-B14F-4D97-AF65-F5344CB8AC3E}">
-        <p14:creationId xmlns:p14="http://schemas.microsoft.com/office/powerpoint/2010/main" val="411883870"/>
+        <p14:creationId xmlns:p14="http://schemas.microsoft.com/office/powerpoint/2010/main" val="623138265"/>
       </p:ext>
     </p:extLst>
   </p:cSld>
@@ -5556,7 +5556,7 @@
           <p:cNvPr id="2" name="Title 1">
             <a:extLst>
               <a:ext uri="{FF2B5EF4-FFF2-40B4-BE49-F238E27FC236}">
-                <a16:creationId xmlns:a16="http://schemas.microsoft.com/office/drawing/2014/main" id="{6446FC3E-04E0-4376-ACDF-DDEAFAE2D15F}"/>
+                <a16:creationId xmlns:a16="http://schemas.microsoft.com/office/drawing/2014/main" id="{7D90C493-C170-442D-9154-AB1D6BA5392D}"/>
               </a:ext>
             </a:extLst>
           </p:cNvPr>
@@ -5574,7 +5574,7 @@
           <a:p>
             <a:r>
               <a:rPr lang="en-US" dirty="0"/>
-              <a:t>References</a:t>
+              <a:t>Going forward</a:t>
             </a:r>
           </a:p>
         </p:txBody>
@@ -5584,7 +5584,7 @@
           <p:cNvPr id="3" name="Content Placeholder 2">
             <a:extLst>
               <a:ext uri="{FF2B5EF4-FFF2-40B4-BE49-F238E27FC236}">
-                <a16:creationId xmlns:a16="http://schemas.microsoft.com/office/drawing/2014/main" id="{6E28126B-4D39-4F48-A127-9115B1A85A37}"/>
+                <a16:creationId xmlns:a16="http://schemas.microsoft.com/office/drawing/2014/main" id="{84EABE29-C074-40A6-9A4C-F3D3D55BE5B0}"/>
               </a:ext>
             </a:extLst>
           </p:cNvPr>
@@ -5607,7 +5607,7 @@
     </p:spTree>
     <p:extLst>
       <p:ext uri="{BB962C8B-B14F-4D97-AF65-F5344CB8AC3E}">
-        <p14:creationId xmlns:p14="http://schemas.microsoft.com/office/powerpoint/2010/main" val="1743536290"/>
+        <p14:creationId xmlns:p14="http://schemas.microsoft.com/office/powerpoint/2010/main" val="411883870"/>
       </p:ext>
     </p:extLst>
   </p:cSld>
@@ -5698,6 +5698,13 @@
             <a:r>
               <a:rPr lang="en-US" dirty="0"/>
               <a:t>Given x (mixture of potentially many signals) recover distinct signals that compose x…etc.</a:t>
+            </a:r>
+          </a:p>
+          <a:p>
+            <a:pPr lvl="1"/>
+            <a:r>
+              <a:rPr lang="en-US" dirty="0"/>
+              <a:t>Insert a formula here</a:t>
             </a:r>
           </a:p>
           <a:p>
@@ -5790,7 +5797,27 @@
           <a:p>
             <a:r>
               <a:rPr lang="en-US" dirty="0"/>
-              <a:t>Discuss motivation behind project: results hoped for, applications where it might be useful?</a:t>
+              <a:t>Well-known and notorious problem for in Computer Science.</a:t>
+            </a:r>
+          </a:p>
+          <a:p>
+            <a:r>
+              <a:rPr lang="en-US" dirty="0"/>
+              <a:t>An efficient approach to solving it has far-reaching ramifications:</a:t>
+            </a:r>
+          </a:p>
+          <a:p>
+            <a:pPr lvl="1"/>
+            <a:r>
+              <a:rPr lang="en-US" dirty="0"/>
+              <a:t>Lol</a:t>
+            </a:r>
+          </a:p>
+          <a:p>
+            <a:pPr lvl="1"/>
+            <a:r>
+              <a:rPr lang="en-US" dirty="0"/>
+              <a:t>results hoped for, applications where it might be useful?</a:t>
             </a:r>
           </a:p>
           <a:p>
@@ -5833,7 +5860,7 @@
           <p:cNvPr id="2" name="Title 1">
             <a:extLst>
               <a:ext uri="{FF2B5EF4-FFF2-40B4-BE49-F238E27FC236}">
-                <a16:creationId xmlns:a16="http://schemas.microsoft.com/office/drawing/2014/main" id="{5ACCBADE-F30F-4011-B25C-BB55C9D91DEB}"/>
+                <a16:creationId xmlns:a16="http://schemas.microsoft.com/office/drawing/2014/main" id="{33F4F0BB-8ACE-4EC2-BE11-6259C5434615}"/>
               </a:ext>
             </a:extLst>
           </p:cNvPr>
@@ -5851,15 +5878,7 @@
           <a:p>
             <a:r>
               <a:rPr lang="en-US" dirty="0"/>
-              <a:t>Before </a:t>
-            </a:r>
-            <a:r>
-              <a:rPr lang="en-US" dirty="0" err="1"/>
-              <a:t>Candes</a:t>
-            </a:r>
-            <a:r>
-              <a:rPr lang="en-US" dirty="0"/>
-              <a:t> and Tao</a:t>
+              <a:t>Description of Data</a:t>
             </a:r>
           </a:p>
         </p:txBody>
@@ -5869,7 +5888,7 @@
           <p:cNvPr id="3" name="Content Placeholder 2">
             <a:extLst>
               <a:ext uri="{FF2B5EF4-FFF2-40B4-BE49-F238E27FC236}">
-                <a16:creationId xmlns:a16="http://schemas.microsoft.com/office/drawing/2014/main" id="{2497C5BE-E751-48BA-808E-2F4C8C2BC4A2}"/>
+                <a16:creationId xmlns:a16="http://schemas.microsoft.com/office/drawing/2014/main" id="{198C34B8-E434-4533-BD8A-41D7D4DA2E20}"/>
               </a:ext>
             </a:extLst>
           </p:cNvPr>
@@ -5887,21 +5906,52 @@
           <a:p>
             <a:r>
               <a:rPr lang="en-US" dirty="0"/>
-              <a:t>Similar problem structure: minimization of L1 norm</a:t>
-            </a:r>
-          </a:p>
-          <a:p>
+              <a:t>Signals consisted of six word sentences of the form:</a:t>
+            </a:r>
+          </a:p>
+          <a:p>
+            <a:pPr lvl="1"/>
             <a:r>
               <a:rPr lang="en-US" dirty="0"/>
-              <a:t>Non-negative Matrix Factorization</a:t>
-            </a:r>
+              <a:t> &lt;command&gt; &lt;color&gt; &lt;preposition&gt; &lt;letter&gt; &lt;number&gt; &lt;adverb&gt;</a:t>
+            </a:r>
+          </a:p>
+          <a:p>
+            <a:pPr lvl="1"/>
+            <a:r>
+              <a:rPr lang="en-US" dirty="0"/>
+              <a:t>“Place white at L 3 now.”</a:t>
+            </a:r>
+          </a:p>
+          <a:p>
+            <a:r>
+              <a:rPr lang="en-US" dirty="0"/>
+              <a:t>Characteristics:</a:t>
+            </a:r>
+          </a:p>
+          <a:p>
+            <a:pPr lvl="1"/>
+            <a:r>
+              <a:rPr lang="en-US" dirty="0"/>
+              <a:t>Relatively narrow but easily confusable vocabulary</a:t>
+            </a:r>
+          </a:p>
+          <a:p>
+            <a:pPr lvl="1"/>
+            <a:r>
+              <a:rPr lang="en-US" dirty="0"/>
+              <a:t>Makes no demands on higher-level language processing</a:t>
+            </a:r>
+          </a:p>
+          <a:p>
+            <a:endParaRPr lang="en-US" dirty="0"/>
           </a:p>
         </p:txBody>
       </p:sp>
     </p:spTree>
     <p:extLst>
       <p:ext uri="{BB962C8B-B14F-4D97-AF65-F5344CB8AC3E}">
-        <p14:creationId xmlns:p14="http://schemas.microsoft.com/office/powerpoint/2010/main" val="2600530286"/>
+        <p14:creationId xmlns:p14="http://schemas.microsoft.com/office/powerpoint/2010/main" val="2150594502"/>
       </p:ext>
     </p:extLst>
   </p:cSld>
@@ -5933,7 +5983,7 @@
           <p:cNvPr id="2" name="Title 1">
             <a:extLst>
               <a:ext uri="{FF2B5EF4-FFF2-40B4-BE49-F238E27FC236}">
-                <a16:creationId xmlns:a16="http://schemas.microsoft.com/office/drawing/2014/main" id="{47D7EAEE-BF67-4E62-AE1F-C33DEE1B372F}"/>
+                <a16:creationId xmlns:a16="http://schemas.microsoft.com/office/drawing/2014/main" id="{5ACCBADE-F30F-4011-B25C-BB55C9D91DEB}"/>
               </a:ext>
             </a:extLst>
           </p:cNvPr>
@@ -5951,7 +6001,7 @@
           <a:p>
             <a:r>
               <a:rPr lang="en-US" dirty="0"/>
-              <a:t>Example</a:t>
+              <a:t>Previous Work</a:t>
             </a:r>
           </a:p>
         </p:txBody>
@@ -5961,7 +6011,7 @@
           <p:cNvPr id="3" name="Content Placeholder 2">
             <a:extLst>
               <a:ext uri="{FF2B5EF4-FFF2-40B4-BE49-F238E27FC236}">
-                <a16:creationId xmlns:a16="http://schemas.microsoft.com/office/drawing/2014/main" id="{749D6EA3-9E72-4B79-A41E-10F78E76E50B}"/>
+                <a16:creationId xmlns:a16="http://schemas.microsoft.com/office/drawing/2014/main" id="{2497C5BE-E751-48BA-808E-2F4C8C2BC4A2}"/>
               </a:ext>
             </a:extLst>
           </p:cNvPr>
@@ -5978,12 +6028,20 @@
           <a:lstStyle/>
           <a:p>
             <a:r>
-              <a:rPr lang="en-US" dirty="0" err="1"/>
-              <a:t>Lolbad</a:t>
-            </a:r>
-            <a:r>
               <a:rPr lang="en-US" dirty="0"/>
-              <a:t> example lol</a:t>
+              <a:t>Similar problem structure: minimization of L1 norm</a:t>
+            </a:r>
+          </a:p>
+          <a:p>
+            <a:r>
+              <a:rPr lang="en-US" dirty="0"/>
+              <a:t>Non-negative Matrix Factorization problem statement and goals</a:t>
+            </a:r>
+          </a:p>
+          <a:p>
+            <a:r>
+              <a:rPr lang="en-US" dirty="0"/>
+              <a:t>Deep Learning and Hidden Markov Models have since surpassed this method of approaching the Problem.</a:t>
             </a:r>
           </a:p>
         </p:txBody>
@@ -5991,7 +6049,7 @@
     </p:spTree>
     <p:extLst>
       <p:ext uri="{BB962C8B-B14F-4D97-AF65-F5344CB8AC3E}">
-        <p14:creationId xmlns:p14="http://schemas.microsoft.com/office/powerpoint/2010/main" val="2454288205"/>
+        <p14:creationId xmlns:p14="http://schemas.microsoft.com/office/powerpoint/2010/main" val="2600530286"/>
       </p:ext>
     </p:extLst>
   </p:cSld>
@@ -6023,7 +6081,7 @@
           <p:cNvPr id="2" name="Title 1">
             <a:extLst>
               <a:ext uri="{FF2B5EF4-FFF2-40B4-BE49-F238E27FC236}">
-                <a16:creationId xmlns:a16="http://schemas.microsoft.com/office/drawing/2014/main" id="{D5064180-9112-4D62-BBA1-59C74DB8F042}"/>
+                <a16:creationId xmlns:a16="http://schemas.microsoft.com/office/drawing/2014/main" id="{47D7EAEE-BF67-4E62-AE1F-C33DEE1B372F}"/>
               </a:ext>
             </a:extLst>
           </p:cNvPr>
@@ -6041,7 +6099,7 @@
           <a:p>
             <a:r>
               <a:rPr lang="en-US" dirty="0"/>
-              <a:t>A Compressive Sensing approach</a:t>
+              <a:t>Example</a:t>
             </a:r>
           </a:p>
         </p:txBody>
@@ -6051,7 +6109,7 @@
           <p:cNvPr id="3" name="Content Placeholder 2">
             <a:extLst>
               <a:ext uri="{FF2B5EF4-FFF2-40B4-BE49-F238E27FC236}">
-                <a16:creationId xmlns:a16="http://schemas.microsoft.com/office/drawing/2014/main" id="{DE859723-A486-46FE-8F23-EF0C9B09BD62}"/>
+                <a16:creationId xmlns:a16="http://schemas.microsoft.com/office/drawing/2014/main" id="{749D6EA3-9E72-4B79-A41E-10F78E76E50B}"/>
               </a:ext>
             </a:extLst>
           </p:cNvPr>
@@ -6068,32 +6126,25 @@
           <a:lstStyle/>
           <a:p>
             <a:r>
+              <a:rPr lang="en-US" dirty="0" err="1"/>
+              <a:t>Lolbad</a:t>
+            </a:r>
+            <a:r>
               <a:rPr lang="en-US" dirty="0"/>
-              <a:t>Discuss changes from pre-</a:t>
+              <a:t> </a:t>
             </a:r>
             <a:r>
               <a:rPr lang="en-US" dirty="0" err="1"/>
-              <a:t>candes</a:t>
-            </a:r>
-            <a:r>
-              <a:rPr lang="en-US" dirty="0"/>
-              <a:t>/</a:t>
-            </a:r>
-            <a:r>
-              <a:rPr lang="en-US" dirty="0" err="1"/>
-              <a:t>tao</a:t>
-            </a:r>
-            <a:r>
-              <a:rPr lang="en-US" dirty="0"/>
-              <a:t> implementation</a:t>
-            </a:r>
+              <a:t>examplelol</a:t>
+            </a:r>
+            <a:endParaRPr lang="en-US" dirty="0"/>
           </a:p>
         </p:txBody>
       </p:sp>
     </p:spTree>
     <p:extLst>
       <p:ext uri="{BB962C8B-B14F-4D97-AF65-F5344CB8AC3E}">
-        <p14:creationId xmlns:p14="http://schemas.microsoft.com/office/powerpoint/2010/main" val="1995583143"/>
+        <p14:creationId xmlns:p14="http://schemas.microsoft.com/office/powerpoint/2010/main" val="2454288205"/>
       </p:ext>
     </p:extLst>
   </p:cSld>
@@ -6125,7 +6176,7 @@
           <p:cNvPr id="2" name="Title 1">
             <a:extLst>
               <a:ext uri="{FF2B5EF4-FFF2-40B4-BE49-F238E27FC236}">
-                <a16:creationId xmlns:a16="http://schemas.microsoft.com/office/drawing/2014/main" id="{23F594AE-9D4D-4D03-A594-89C4CDE30050}"/>
+                <a16:creationId xmlns:a16="http://schemas.microsoft.com/office/drawing/2014/main" id="{D5064180-9112-4D62-BBA1-59C74DB8F042}"/>
               </a:ext>
             </a:extLst>
           </p:cNvPr>
@@ -6141,7 +6192,10 @@
           <a:bodyPr/>
           <a:lstStyle/>
           <a:p>
-            <a:endParaRPr lang="en-US" dirty="0"/>
+            <a:r>
+              <a:rPr lang="en-US" dirty="0"/>
+              <a:t>A Compressive Sensing approach</a:t>
+            </a:r>
           </a:p>
         </p:txBody>
       </p:sp>
@@ -6150,7 +6204,7 @@
           <p:cNvPr id="3" name="Content Placeholder 2">
             <a:extLst>
               <a:ext uri="{FF2B5EF4-FFF2-40B4-BE49-F238E27FC236}">
-                <a16:creationId xmlns:a16="http://schemas.microsoft.com/office/drawing/2014/main" id="{19600D93-6CE4-4A98-BA41-8D7EC24F4F54}"/>
+                <a16:creationId xmlns:a16="http://schemas.microsoft.com/office/drawing/2014/main" id="{DE859723-A486-46FE-8F23-EF0C9B09BD62}"/>
               </a:ext>
             </a:extLst>
           </p:cNvPr>
@@ -6166,14 +6220,33 @@
           <a:bodyPr/>
           <a:lstStyle/>
           <a:p>
-            <a:endParaRPr lang="en-US" dirty="0"/>
+            <a:r>
+              <a:rPr lang="en-US" dirty="0"/>
+              <a:t>Discuss changes from pre-</a:t>
+            </a:r>
+            <a:r>
+              <a:rPr lang="en-US" dirty="0" err="1"/>
+              <a:t>candes</a:t>
+            </a:r>
+            <a:r>
+              <a:rPr lang="en-US" dirty="0"/>
+              <a:t>/</a:t>
+            </a:r>
+            <a:r>
+              <a:rPr lang="en-US" dirty="0" err="1"/>
+              <a:t>tao</a:t>
+            </a:r>
+            <a:r>
+              <a:rPr lang="en-US" dirty="0"/>
+              <a:t> implementation</a:t>
+            </a:r>
           </a:p>
         </p:txBody>
       </p:sp>
     </p:spTree>
     <p:extLst>
       <p:ext uri="{BB962C8B-B14F-4D97-AF65-F5344CB8AC3E}">
-        <p14:creationId xmlns:p14="http://schemas.microsoft.com/office/powerpoint/2010/main" val="1088211595"/>
+        <p14:creationId xmlns:p14="http://schemas.microsoft.com/office/powerpoint/2010/main" val="1995583143"/>
       </p:ext>
     </p:extLst>
   </p:cSld>
@@ -6205,7 +6278,7 @@
           <p:cNvPr id="2" name="Title 1">
             <a:extLst>
               <a:ext uri="{FF2B5EF4-FFF2-40B4-BE49-F238E27FC236}">
-                <a16:creationId xmlns:a16="http://schemas.microsoft.com/office/drawing/2014/main" id="{E440053D-501A-495F-ADDB-4A2E3291553C}"/>
+                <a16:creationId xmlns:a16="http://schemas.microsoft.com/office/drawing/2014/main" id="{23F594AE-9D4D-4D03-A594-89C4CDE30050}"/>
               </a:ext>
             </a:extLst>
           </p:cNvPr>
@@ -6221,10 +6294,7 @@
           <a:bodyPr/>
           <a:lstStyle/>
           <a:p>
-            <a:r>
-              <a:rPr lang="en-US" dirty="0"/>
-              <a:t>Approach</a:t>
-            </a:r>
+            <a:endParaRPr lang="en-US" dirty="0"/>
           </a:p>
         </p:txBody>
       </p:sp>
@@ -6233,7 +6303,7 @@
           <p:cNvPr id="3" name="Content Placeholder 2">
             <a:extLst>
               <a:ext uri="{FF2B5EF4-FFF2-40B4-BE49-F238E27FC236}">
-                <a16:creationId xmlns:a16="http://schemas.microsoft.com/office/drawing/2014/main" id="{7D4A5B65-93E4-4C20-8FDC-F743C77C91BF}"/>
+                <a16:creationId xmlns:a16="http://schemas.microsoft.com/office/drawing/2014/main" id="{19600D93-6CE4-4A98-BA41-8D7EC24F4F54}"/>
               </a:ext>
             </a:extLst>
           </p:cNvPr>
@@ -6249,14 +6319,14 @@
           <a:bodyPr/>
           <a:lstStyle/>
           <a:p>
-            <a:endParaRPr lang="en-US"/>
+            <a:endParaRPr lang="en-US" dirty="0"/>
           </a:p>
         </p:txBody>
       </p:sp>
     </p:spTree>
     <p:extLst>
       <p:ext uri="{BB962C8B-B14F-4D97-AF65-F5344CB8AC3E}">
-        <p14:creationId xmlns:p14="http://schemas.microsoft.com/office/powerpoint/2010/main" val="1723405738"/>
+        <p14:creationId xmlns:p14="http://schemas.microsoft.com/office/powerpoint/2010/main" val="1088211595"/>
       </p:ext>
     </p:extLst>
   </p:cSld>
@@ -6288,7 +6358,7 @@
           <p:cNvPr id="2" name="Title 1">
             <a:extLst>
               <a:ext uri="{FF2B5EF4-FFF2-40B4-BE49-F238E27FC236}">
-                <a16:creationId xmlns:a16="http://schemas.microsoft.com/office/drawing/2014/main" id="{B0CFB2A9-782A-4580-BC98-13BC1976EDD1}"/>
+                <a16:creationId xmlns:a16="http://schemas.microsoft.com/office/drawing/2014/main" id="{E440053D-501A-495F-ADDB-4A2E3291553C}"/>
               </a:ext>
             </a:extLst>
           </p:cNvPr>
@@ -6306,7 +6376,7 @@
           <a:p>
             <a:r>
               <a:rPr lang="en-US" dirty="0"/>
-              <a:t>Results</a:t>
+              <a:t>Approach</a:t>
             </a:r>
           </a:p>
         </p:txBody>
@@ -6316,7 +6386,7 @@
           <p:cNvPr id="3" name="Content Placeholder 2">
             <a:extLst>
               <a:ext uri="{FF2B5EF4-FFF2-40B4-BE49-F238E27FC236}">
-                <a16:creationId xmlns:a16="http://schemas.microsoft.com/office/drawing/2014/main" id="{A36212B8-B021-4872-B27E-86C4647A9FF1}"/>
+                <a16:creationId xmlns:a16="http://schemas.microsoft.com/office/drawing/2014/main" id="{7D4A5B65-93E4-4C20-8FDC-F743C77C91BF}"/>
               </a:ext>
             </a:extLst>
           </p:cNvPr>
@@ -6339,7 +6409,7 @@
     </p:spTree>
     <p:extLst>
       <p:ext uri="{BB962C8B-B14F-4D97-AF65-F5344CB8AC3E}">
-        <p14:creationId xmlns:p14="http://schemas.microsoft.com/office/powerpoint/2010/main" val="623138265"/>
+        <p14:creationId xmlns:p14="http://schemas.microsoft.com/office/powerpoint/2010/main" val="1723405738"/>
       </p:ext>
     </p:extLst>
   </p:cSld>

</xml_diff>

<commit_message>
Adds equations to slides and logo
</commit_message>
<xml_diff>
--- a/slide/slides.pptx
+++ b/slide/slides.pptx
@@ -4,6 +4,9 @@
   <p:sldMasterIdLst>
     <p:sldMasterId id="2147483696" r:id="rId1"/>
   </p:sldMasterIdLst>
+  <p:notesMasterIdLst>
+    <p:notesMasterId r:id="rId13"/>
+  </p:notesMasterIdLst>
   <p:sldIdLst>
     <p:sldId id="256" r:id="rId2"/>
     <p:sldId id="257" r:id="rId3"/>
@@ -12,9 +15,10 @@
     <p:sldId id="263" r:id="rId6"/>
     <p:sldId id="264" r:id="rId7"/>
     <p:sldId id="265" r:id="rId8"/>
-    <p:sldId id="258" r:id="rId9"/>
-    <p:sldId id="259" r:id="rId10"/>
-    <p:sldId id="261" r:id="rId11"/>
+    <p:sldId id="268" r:id="rId9"/>
+    <p:sldId id="258" r:id="rId10"/>
+    <p:sldId id="259" r:id="rId11"/>
+    <p:sldId id="261" r:id="rId12"/>
   </p:sldIdLst>
   <p:sldSz cx="12192000" cy="6858000"/>
   <p:notesSz cx="6858000" cy="9144000"/>
@@ -125,6 +129,356 @@
 <p1510:revInfo xmlns:a="http://schemas.openxmlformats.org/drawingml/2006/main" xmlns:r="http://schemas.openxmlformats.org/officeDocument/2006/relationships" xmlns:p1510="http://schemas.microsoft.com/office/powerpoint/2015/10/main"/>
 </file>
 
+<file path=ppt/notesMasters/notesMaster1.xml><?xml version="1.0" encoding="utf-8"?>
+<p:notesMaster xmlns:a="http://schemas.openxmlformats.org/drawingml/2006/main" xmlns:r="http://schemas.openxmlformats.org/officeDocument/2006/relationships" xmlns:p="http://schemas.openxmlformats.org/presentationml/2006/main">
+  <p:cSld>
+    <p:bg>
+      <p:bgRef idx="1001">
+        <a:schemeClr val="bg1"/>
+      </p:bgRef>
+    </p:bg>
+    <p:spTree>
+      <p:nvGrpSpPr>
+        <p:cNvPr id="1" name=""/>
+        <p:cNvGrpSpPr/>
+        <p:nvPr/>
+      </p:nvGrpSpPr>
+      <p:grpSpPr>
+        <a:xfrm>
+          <a:off x="0" y="0"/>
+          <a:ext cx="0" cy="0"/>
+          <a:chOff x="0" y="0"/>
+          <a:chExt cx="0" cy="0"/>
+        </a:xfrm>
+      </p:grpSpPr>
+      <p:sp>
+        <p:nvSpPr>
+          <p:cNvPr id="2" name="Header Placeholder 1"/>
+          <p:cNvSpPr>
+            <a:spLocks noGrp="1"/>
+          </p:cNvSpPr>
+          <p:nvPr>
+            <p:ph type="hdr" sz="quarter"/>
+          </p:nvPr>
+        </p:nvSpPr>
+        <p:spPr>
+          <a:xfrm>
+            <a:off x="0" y="0"/>
+            <a:ext cx="2971800" cy="458788"/>
+          </a:xfrm>
+          <a:prstGeom prst="rect">
+            <a:avLst/>
+          </a:prstGeom>
+        </p:spPr>
+        <p:txBody>
+          <a:bodyPr vert="horz" lIns="91440" tIns="45720" rIns="91440" bIns="45720" rtlCol="0"/>
+          <a:lstStyle>
+            <a:lvl1pPr algn="l">
+              <a:defRPr sz="1200"/>
+            </a:lvl1pPr>
+          </a:lstStyle>
+          <a:p>
+            <a:endParaRPr lang="en-US"/>
+          </a:p>
+        </p:txBody>
+      </p:sp>
+      <p:sp>
+        <p:nvSpPr>
+          <p:cNvPr id="3" name="Date Placeholder 2"/>
+          <p:cNvSpPr>
+            <a:spLocks noGrp="1"/>
+          </p:cNvSpPr>
+          <p:nvPr>
+            <p:ph type="dt" idx="1"/>
+          </p:nvPr>
+        </p:nvSpPr>
+        <p:spPr>
+          <a:xfrm>
+            <a:off x="3884613" y="0"/>
+            <a:ext cx="2971800" cy="458788"/>
+          </a:xfrm>
+          <a:prstGeom prst="rect">
+            <a:avLst/>
+          </a:prstGeom>
+        </p:spPr>
+        <p:txBody>
+          <a:bodyPr vert="horz" lIns="91440" tIns="45720" rIns="91440" bIns="45720" rtlCol="0"/>
+          <a:lstStyle>
+            <a:lvl1pPr algn="r">
+              <a:defRPr sz="1200"/>
+            </a:lvl1pPr>
+          </a:lstStyle>
+          <a:p>
+            <a:fld id="{21BFEF3B-49AA-4F5C-A360-04ACFF3348EE}" type="datetimeFigureOut">
+              <a:rPr lang="en-US" smtClean="0"/>
+              <a:t>12/6/2017</a:t>
+            </a:fld>
+            <a:endParaRPr lang="en-US"/>
+          </a:p>
+        </p:txBody>
+      </p:sp>
+      <p:sp>
+        <p:nvSpPr>
+          <p:cNvPr id="4" name="Slide Image Placeholder 3"/>
+          <p:cNvSpPr>
+            <a:spLocks noGrp="1" noRot="1" noChangeAspect="1"/>
+          </p:cNvSpPr>
+          <p:nvPr>
+            <p:ph type="sldImg" idx="2"/>
+          </p:nvPr>
+        </p:nvSpPr>
+        <p:spPr>
+          <a:xfrm>
+            <a:off x="685800" y="1143000"/>
+            <a:ext cx="5486400" cy="3086100"/>
+          </a:xfrm>
+          <a:prstGeom prst="rect">
+            <a:avLst/>
+          </a:prstGeom>
+          <a:noFill/>
+          <a:ln w="12700">
+            <a:solidFill>
+              <a:prstClr val="black"/>
+            </a:solidFill>
+          </a:ln>
+        </p:spPr>
+        <p:txBody>
+          <a:bodyPr vert="horz" lIns="91440" tIns="45720" rIns="91440" bIns="45720" rtlCol="0" anchor="ctr"/>
+          <a:lstStyle/>
+          <a:p>
+            <a:endParaRPr lang="en-US"/>
+          </a:p>
+        </p:txBody>
+      </p:sp>
+      <p:sp>
+        <p:nvSpPr>
+          <p:cNvPr id="5" name="Notes Placeholder 4"/>
+          <p:cNvSpPr>
+            <a:spLocks noGrp="1"/>
+          </p:cNvSpPr>
+          <p:nvPr>
+            <p:ph type="body" sz="quarter" idx="3"/>
+          </p:nvPr>
+        </p:nvSpPr>
+        <p:spPr>
+          <a:xfrm>
+            <a:off x="685800" y="4400550"/>
+            <a:ext cx="5486400" cy="3600450"/>
+          </a:xfrm>
+          <a:prstGeom prst="rect">
+            <a:avLst/>
+          </a:prstGeom>
+        </p:spPr>
+        <p:txBody>
+          <a:bodyPr vert="horz" lIns="91440" tIns="45720" rIns="91440" bIns="45720" rtlCol="0"/>
+          <a:lstStyle/>
+          <a:p>
+            <a:pPr lvl="0"/>
+            <a:r>
+              <a:rPr lang="en-US" smtClean="0"/>
+              <a:t>Edit Master text styles</a:t>
+            </a:r>
+          </a:p>
+          <a:p>
+            <a:pPr lvl="1"/>
+            <a:r>
+              <a:rPr lang="en-US" smtClean="0"/>
+              <a:t>Second level</a:t>
+            </a:r>
+          </a:p>
+          <a:p>
+            <a:pPr lvl="2"/>
+            <a:r>
+              <a:rPr lang="en-US" smtClean="0"/>
+              <a:t>Third level</a:t>
+            </a:r>
+          </a:p>
+          <a:p>
+            <a:pPr lvl="3"/>
+            <a:r>
+              <a:rPr lang="en-US" smtClean="0"/>
+              <a:t>Fourth level</a:t>
+            </a:r>
+          </a:p>
+          <a:p>
+            <a:pPr lvl="4"/>
+            <a:r>
+              <a:rPr lang="en-US" smtClean="0"/>
+              <a:t>Fifth level</a:t>
+            </a:r>
+            <a:endParaRPr lang="en-US"/>
+          </a:p>
+        </p:txBody>
+      </p:sp>
+      <p:sp>
+        <p:nvSpPr>
+          <p:cNvPr id="6" name="Footer Placeholder 5"/>
+          <p:cNvSpPr>
+            <a:spLocks noGrp="1"/>
+          </p:cNvSpPr>
+          <p:nvPr>
+            <p:ph type="ftr" sz="quarter" idx="4"/>
+          </p:nvPr>
+        </p:nvSpPr>
+        <p:spPr>
+          <a:xfrm>
+            <a:off x="0" y="8685213"/>
+            <a:ext cx="2971800" cy="458787"/>
+          </a:xfrm>
+          <a:prstGeom prst="rect">
+            <a:avLst/>
+          </a:prstGeom>
+        </p:spPr>
+        <p:txBody>
+          <a:bodyPr vert="horz" lIns="91440" tIns="45720" rIns="91440" bIns="45720" rtlCol="0" anchor="b"/>
+          <a:lstStyle>
+            <a:lvl1pPr algn="l">
+              <a:defRPr sz="1200"/>
+            </a:lvl1pPr>
+          </a:lstStyle>
+          <a:p>
+            <a:endParaRPr lang="en-US"/>
+          </a:p>
+        </p:txBody>
+      </p:sp>
+      <p:sp>
+        <p:nvSpPr>
+          <p:cNvPr id="7" name="Slide Number Placeholder 6"/>
+          <p:cNvSpPr>
+            <a:spLocks noGrp="1"/>
+          </p:cNvSpPr>
+          <p:nvPr>
+            <p:ph type="sldNum" sz="quarter" idx="5"/>
+          </p:nvPr>
+        </p:nvSpPr>
+        <p:spPr>
+          <a:xfrm>
+            <a:off x="3884613" y="8685213"/>
+            <a:ext cx="2971800" cy="458787"/>
+          </a:xfrm>
+          <a:prstGeom prst="rect">
+            <a:avLst/>
+          </a:prstGeom>
+        </p:spPr>
+        <p:txBody>
+          <a:bodyPr vert="horz" lIns="91440" tIns="45720" rIns="91440" bIns="45720" rtlCol="0" anchor="b"/>
+          <a:lstStyle>
+            <a:lvl1pPr algn="r">
+              <a:defRPr sz="1200"/>
+            </a:lvl1pPr>
+          </a:lstStyle>
+          <a:p>
+            <a:fld id="{FC07DC90-6865-482C-B9C6-831FD29CD669}" type="slidenum">
+              <a:rPr lang="en-US" smtClean="0"/>
+              <a:t>‹#›</a:t>
+            </a:fld>
+            <a:endParaRPr lang="en-US"/>
+          </a:p>
+        </p:txBody>
+      </p:sp>
+    </p:spTree>
+    <p:extLst>
+      <p:ext uri="{BB962C8B-B14F-4D97-AF65-F5344CB8AC3E}">
+        <p14:creationId xmlns:p14="http://schemas.microsoft.com/office/powerpoint/2010/main" val="1519358524"/>
+      </p:ext>
+    </p:extLst>
+  </p:cSld>
+  <p:clrMap bg1="lt1" tx1="dk1" bg2="lt2" tx2="dk2" accent1="accent1" accent2="accent2" accent3="accent3" accent4="accent4" accent5="accent5" accent6="accent6" hlink="hlink" folHlink="folHlink"/>
+  <p:notesStyle>
+    <a:lvl1pPr marL="0" algn="l" defTabSz="914400" rtl="0" eaLnBrk="1" latinLnBrk="0" hangingPunct="1">
+      <a:defRPr sz="1200" kern="1200">
+        <a:solidFill>
+          <a:schemeClr val="tx1"/>
+        </a:solidFill>
+        <a:latin typeface="+mn-lt"/>
+        <a:ea typeface="+mn-ea"/>
+        <a:cs typeface="+mn-cs"/>
+      </a:defRPr>
+    </a:lvl1pPr>
+    <a:lvl2pPr marL="457200" algn="l" defTabSz="914400" rtl="0" eaLnBrk="1" latinLnBrk="0" hangingPunct="1">
+      <a:defRPr sz="1200" kern="1200">
+        <a:solidFill>
+          <a:schemeClr val="tx1"/>
+        </a:solidFill>
+        <a:latin typeface="+mn-lt"/>
+        <a:ea typeface="+mn-ea"/>
+        <a:cs typeface="+mn-cs"/>
+      </a:defRPr>
+    </a:lvl2pPr>
+    <a:lvl3pPr marL="914400" algn="l" defTabSz="914400" rtl="0" eaLnBrk="1" latinLnBrk="0" hangingPunct="1">
+      <a:defRPr sz="1200" kern="1200">
+        <a:solidFill>
+          <a:schemeClr val="tx1"/>
+        </a:solidFill>
+        <a:latin typeface="+mn-lt"/>
+        <a:ea typeface="+mn-ea"/>
+        <a:cs typeface="+mn-cs"/>
+      </a:defRPr>
+    </a:lvl3pPr>
+    <a:lvl4pPr marL="1371600" algn="l" defTabSz="914400" rtl="0" eaLnBrk="1" latinLnBrk="0" hangingPunct="1">
+      <a:defRPr sz="1200" kern="1200">
+        <a:solidFill>
+          <a:schemeClr val="tx1"/>
+        </a:solidFill>
+        <a:latin typeface="+mn-lt"/>
+        <a:ea typeface="+mn-ea"/>
+        <a:cs typeface="+mn-cs"/>
+      </a:defRPr>
+    </a:lvl4pPr>
+    <a:lvl5pPr marL="1828800" algn="l" defTabSz="914400" rtl="0" eaLnBrk="1" latinLnBrk="0" hangingPunct="1">
+      <a:defRPr sz="1200" kern="1200">
+        <a:solidFill>
+          <a:schemeClr val="tx1"/>
+        </a:solidFill>
+        <a:latin typeface="+mn-lt"/>
+        <a:ea typeface="+mn-ea"/>
+        <a:cs typeface="+mn-cs"/>
+      </a:defRPr>
+    </a:lvl5pPr>
+    <a:lvl6pPr marL="2286000" algn="l" defTabSz="914400" rtl="0" eaLnBrk="1" latinLnBrk="0" hangingPunct="1">
+      <a:defRPr sz="1200" kern="1200">
+        <a:solidFill>
+          <a:schemeClr val="tx1"/>
+        </a:solidFill>
+        <a:latin typeface="+mn-lt"/>
+        <a:ea typeface="+mn-ea"/>
+        <a:cs typeface="+mn-cs"/>
+      </a:defRPr>
+    </a:lvl6pPr>
+    <a:lvl7pPr marL="2743200" algn="l" defTabSz="914400" rtl="0" eaLnBrk="1" latinLnBrk="0" hangingPunct="1">
+      <a:defRPr sz="1200" kern="1200">
+        <a:solidFill>
+          <a:schemeClr val="tx1"/>
+        </a:solidFill>
+        <a:latin typeface="+mn-lt"/>
+        <a:ea typeface="+mn-ea"/>
+        <a:cs typeface="+mn-cs"/>
+      </a:defRPr>
+    </a:lvl7pPr>
+    <a:lvl8pPr marL="3200400" algn="l" defTabSz="914400" rtl="0" eaLnBrk="1" latinLnBrk="0" hangingPunct="1">
+      <a:defRPr sz="1200" kern="1200">
+        <a:solidFill>
+          <a:schemeClr val="tx1"/>
+        </a:solidFill>
+        <a:latin typeface="+mn-lt"/>
+        <a:ea typeface="+mn-ea"/>
+        <a:cs typeface="+mn-cs"/>
+      </a:defRPr>
+    </a:lvl8pPr>
+    <a:lvl9pPr marL="3657600" algn="l" defTabSz="914400" rtl="0" eaLnBrk="1" latinLnBrk="0" hangingPunct="1">
+      <a:defRPr sz="1200" kern="1200">
+        <a:solidFill>
+          <a:schemeClr val="tx1"/>
+        </a:solidFill>
+        <a:latin typeface="+mn-lt"/>
+        <a:ea typeface="+mn-ea"/>
+        <a:cs typeface="+mn-cs"/>
+      </a:defRPr>
+    </a:lvl9pPr>
+  </p:notesStyle>
+</p:notesMaster>
+</file>
+
 <file path=ppt/slideLayouts/slideLayout1.xml><?xml version="1.0" encoding="utf-8"?>
 <p:sldLayout xmlns:a="http://schemas.openxmlformats.org/drawingml/2006/main" xmlns:r="http://schemas.openxmlformats.org/officeDocument/2006/relationships" xmlns:p="http://schemas.openxmlformats.org/presentationml/2006/main" type="title" preserve="1">
   <p:cSld name="Title Slide">
@@ -243,7 +597,7 @@
           </a:lstStyle>
           <a:p>
             <a:r>
-              <a:rPr lang="en-US"/>
+              <a:rPr lang="en-US" dirty="0"/>
               <a:t>Click to edit Master subtitle style</a:t>
             </a:r>
           </a:p>
@@ -270,7 +624,7 @@
           <a:bodyPr/>
           <a:lstStyle/>
           <a:p>
-            <a:fld id="{64A20A0C-C0EC-41AD-94B7-C36037CF9025}" type="datetimeFigureOut">
+            <a:fld id="{5A9A701E-D89B-4EC3-95C4-B14A55B23F94}" type="datetime1">
               <a:rPr lang="en-US" smtClean="0"/>
               <a:t>12/6/2017</a:t>
             </a:fld>
@@ -322,13 +676,18 @@
         <p:spPr/>
         <p:txBody>
           <a:bodyPr/>
-          <a:lstStyle/>
+          <a:lstStyle>
+            <a:lvl1pPr>
+              <a:defRPr sz="1800" b="1"/>
+            </a:lvl1pPr>
+          </a:lstStyle>
           <a:p>
             <a:fld id="{0D14E344-43A7-4D61-B7CB-7B7571C47B84}" type="slidenum">
               <a:rPr lang="en-US" smtClean="0"/>
+              <a:pPr/>
               <a:t>‹#›</a:t>
             </a:fld>
-            <a:endParaRPr lang="en-US"/>
+            <a:endParaRPr lang="en-US" dirty="0"/>
           </a:p>
         </p:txBody>
       </p:sp>
@@ -342,6 +701,13 @@
   <p:clrMapOvr>
     <a:masterClrMapping/>
   </p:clrMapOvr>
+  <p:timing>
+    <p:tnLst>
+      <p:par>
+        <p:cTn id="1" dur="indefinite" restart="never" nodeType="tmRoot"/>
+      </p:par>
+    </p:tnLst>
+  </p:timing>
 </p:sldLayout>
 </file>
 
@@ -468,7 +834,7 @@
           <a:bodyPr/>
           <a:lstStyle/>
           <a:p>
-            <a:fld id="{64A20A0C-C0EC-41AD-94B7-C36037CF9025}" type="datetimeFigureOut">
+            <a:fld id="{19EC676B-7638-4E63-B671-0B589029018E}" type="datetime1">
               <a:rPr lang="en-US" smtClean="0"/>
               <a:t>12/6/2017</a:t>
             </a:fld>
@@ -676,7 +1042,7 @@
           <a:bodyPr/>
           <a:lstStyle/>
           <a:p>
-            <a:fld id="{64A20A0C-C0EC-41AD-94B7-C36037CF9025}" type="datetimeFigureOut">
+            <a:fld id="{79F381E5-9EAA-4A0E-8603-1C5E3FC8EAD7}" type="datetime1">
               <a:rPr lang="en-US" smtClean="0"/>
               <a:t>12/6/2017</a:t>
             </a:fld>
@@ -874,7 +1240,7 @@
           <a:bodyPr/>
           <a:lstStyle/>
           <a:p>
-            <a:fld id="{64A20A0C-C0EC-41AD-94B7-C36037CF9025}" type="datetimeFigureOut">
+            <a:fld id="{E993EFCD-F14D-467C-880A-082222001A8F}" type="datetime1">
               <a:rPr lang="en-US" smtClean="0"/>
               <a:t>12/6/2017</a:t>
             </a:fld>
@@ -926,13 +1292,18 @@
         <p:spPr/>
         <p:txBody>
           <a:bodyPr/>
-          <a:lstStyle/>
+          <a:lstStyle>
+            <a:lvl1pPr>
+              <a:defRPr b="1"/>
+            </a:lvl1pPr>
+          </a:lstStyle>
           <a:p>
             <a:fld id="{0D14E344-43A7-4D61-B7CB-7B7571C47B84}" type="slidenum">
               <a:rPr lang="en-US" smtClean="0"/>
+              <a:pPr/>
               <a:t>‹#›</a:t>
             </a:fld>
-            <a:endParaRPr lang="en-US"/>
+            <a:endParaRPr lang="en-US" dirty="0"/>
           </a:p>
         </p:txBody>
       </p:sp>
@@ -946,6 +1317,13 @@
   <p:clrMapOvr>
     <a:masterClrMapping/>
   </p:clrMapOvr>
+  <p:timing>
+    <p:tnLst>
+      <p:par>
+        <p:cTn id="1" dur="indefinite" restart="never" nodeType="tmRoot"/>
+      </p:par>
+    </p:tnLst>
+  </p:timing>
 </p:sldLayout>
 </file>
 
@@ -1149,7 +1527,7 @@
           <a:bodyPr/>
           <a:lstStyle/>
           <a:p>
-            <a:fld id="{64A20A0C-C0EC-41AD-94B7-C36037CF9025}" type="datetimeFigureOut">
+            <a:fld id="{260D76E1-8D17-4AC9-BCF2-EF08B60C6FF5}" type="datetime1">
               <a:rPr lang="en-US" smtClean="0"/>
               <a:t>12/6/2017</a:t>
             </a:fld>
@@ -1221,6 +1599,13 @@
   <p:clrMapOvr>
     <a:masterClrMapping/>
   </p:clrMapOvr>
+  <p:timing>
+    <p:tnLst>
+      <p:par>
+        <p:cTn id="1" dur="indefinite" restart="never" nodeType="tmRoot"/>
+      </p:par>
+    </p:tnLst>
+  </p:timing>
 </p:sldLayout>
 </file>
 
@@ -1414,7 +1799,7 @@
           <a:bodyPr/>
           <a:lstStyle/>
           <a:p>
-            <a:fld id="{64A20A0C-C0EC-41AD-94B7-C36037CF9025}" type="datetimeFigureOut">
+            <a:fld id="{8BF77511-8FBD-42DB-BF81-C60CDB296033}" type="datetime1">
               <a:rPr lang="en-US" smtClean="0"/>
               <a:t>12/6/2017</a:t>
             </a:fld>
@@ -1486,6 +1871,13 @@
   <p:clrMapOvr>
     <a:masterClrMapping/>
   </p:clrMapOvr>
+  <p:timing>
+    <p:tnLst>
+      <p:par>
+        <p:cTn id="1" dur="indefinite" restart="never" nodeType="tmRoot"/>
+      </p:par>
+    </p:tnLst>
+  </p:timing>
 </p:sldLayout>
 </file>
 
@@ -1826,7 +2218,7 @@
           <a:bodyPr/>
           <a:lstStyle/>
           <a:p>
-            <a:fld id="{64A20A0C-C0EC-41AD-94B7-C36037CF9025}" type="datetimeFigureOut">
+            <a:fld id="{7D0F7A3B-1116-4FE7-B624-DC2CDA3ACB2F}" type="datetime1">
               <a:rPr lang="en-US" smtClean="0"/>
               <a:t>12/6/2017</a:t>
             </a:fld>
@@ -1967,7 +2359,7 @@
           <a:bodyPr/>
           <a:lstStyle/>
           <a:p>
-            <a:fld id="{64A20A0C-C0EC-41AD-94B7-C36037CF9025}" type="datetimeFigureOut">
+            <a:fld id="{F271DEAA-0B3D-413A-B180-DC5AF4564A20}" type="datetime1">
               <a:rPr lang="en-US" smtClean="0"/>
               <a:t>12/6/2017</a:t>
             </a:fld>
@@ -2080,7 +2472,7 @@
           <a:bodyPr/>
           <a:lstStyle/>
           <a:p>
-            <a:fld id="{64A20A0C-C0EC-41AD-94B7-C36037CF9025}" type="datetimeFigureOut">
+            <a:fld id="{74080FA0-6BE4-45A6-A4AE-8788A3AA0036}" type="datetime1">
               <a:rPr lang="en-US" smtClean="0"/>
               <a:t>12/6/2017</a:t>
             </a:fld>
@@ -2391,7 +2783,7 @@
           <a:bodyPr/>
           <a:lstStyle/>
           <a:p>
-            <a:fld id="{64A20A0C-C0EC-41AD-94B7-C36037CF9025}" type="datetimeFigureOut">
+            <a:fld id="{730C22E9-ACEC-4D13-A515-E25B750C94AA}" type="datetime1">
               <a:rPr lang="en-US" smtClean="0"/>
               <a:t>12/6/2017</a:t>
             </a:fld>
@@ -2679,7 +3071,7 @@
           <a:bodyPr/>
           <a:lstStyle/>
           <a:p>
-            <a:fld id="{64A20A0C-C0EC-41AD-94B7-C36037CF9025}" type="datetimeFigureOut">
+            <a:fld id="{7DB1D7A9-71BE-4D39-8527-40D9FCFB203B}" type="datetime1">
               <a:rPr lang="en-US" smtClean="0"/>
               <a:t>12/6/2017</a:t>
             </a:fld>
@@ -2847,35 +3239,35 @@
           <a:p>
             <a:pPr lvl="0"/>
             <a:r>
-              <a:rPr lang="en-US"/>
+              <a:rPr lang="en-US" dirty="0"/>
               <a:t>Edit Master text styles</a:t>
             </a:r>
           </a:p>
           <a:p>
             <a:pPr lvl="1"/>
             <a:r>
-              <a:rPr lang="en-US"/>
+              <a:rPr lang="en-US" dirty="0"/>
               <a:t>Second level</a:t>
             </a:r>
           </a:p>
           <a:p>
             <a:pPr lvl="2"/>
             <a:r>
-              <a:rPr lang="en-US"/>
+              <a:rPr lang="en-US" dirty="0"/>
               <a:t>Third level</a:t>
             </a:r>
           </a:p>
           <a:p>
             <a:pPr lvl="3"/>
             <a:r>
-              <a:rPr lang="en-US"/>
+              <a:rPr lang="en-US" dirty="0"/>
               <a:t>Fourth level</a:t>
             </a:r>
           </a:p>
           <a:p>
             <a:pPr lvl="4"/>
             <a:r>
-              <a:rPr lang="en-US"/>
+              <a:rPr lang="en-US" dirty="0"/>
               <a:t>Fifth level</a:t>
             </a:r>
           </a:p>
@@ -2920,7 +3312,7 @@
             </a:lvl1pPr>
           </a:lstStyle>
           <a:p>
-            <a:fld id="{64A20A0C-C0EC-41AD-94B7-C36037CF9025}" type="datetimeFigureOut">
+            <a:fld id="{54E3451C-0CA3-47F9-A3CF-CEB5AE056AC9}" type="datetime1">
               <a:rPr lang="en-US" smtClean="0"/>
               <a:t>12/6/2017</a:t>
             </a:fld>
@@ -3000,7 +3392,7 @@
           <a:bodyPr vert="horz" lIns="91440" tIns="45720" rIns="91440" bIns="45720" rtlCol="0" anchor="ctr"/>
           <a:lstStyle>
             <a:lvl1pPr algn="r">
-              <a:defRPr sz="1200">
+              <a:defRPr sz="1800" b="1">
                 <a:solidFill>
                   <a:schemeClr val="tx1">
                     <a:tint val="75000"/>
@@ -3012,12 +3404,43 @@
           <a:p>
             <a:fld id="{0D14E344-43A7-4D61-B7CB-7B7571C47B84}" type="slidenum">
               <a:rPr lang="en-US" smtClean="0"/>
+              <a:pPr/>
               <a:t>‹#›</a:t>
             </a:fld>
-            <a:endParaRPr lang="en-US"/>
-          </a:p>
-        </p:txBody>
-      </p:sp>
+            <a:endParaRPr lang="en-US" dirty="0"/>
+          </a:p>
+        </p:txBody>
+      </p:sp>
+      <p:pic>
+        <p:nvPicPr>
+          <p:cNvPr id="7" name="Picture 6"/>
+          <p:cNvPicPr>
+            <a:picLocks noChangeAspect="1"/>
+          </p:cNvPicPr>
+          <p:nvPr userDrawn="1"/>
+        </p:nvPicPr>
+        <p:blipFill>
+          <a:blip r:embed="rId13" cstate="print">
+            <a:extLst>
+              <a:ext uri="{28A0092B-C50C-407E-A947-70E740481C1C}">
+                <a14:useLocalDpi xmlns:a14="http://schemas.microsoft.com/office/drawing/2010/main" val="0"/>
+              </a:ext>
+            </a:extLst>
+          </a:blip>
+          <a:stretch>
+            <a:fillRect/>
+          </a:stretch>
+        </p:blipFill>
+        <p:spPr>
+          <a:xfrm>
+            <a:off x="10930127" y="365125"/>
+            <a:ext cx="847346" cy="594361"/>
+          </a:xfrm>
+          <a:prstGeom prst="rect">
+            <a:avLst/>
+          </a:prstGeom>
+        </p:spPr>
+      </p:pic>
     </p:spTree>
     <p:extLst>
       <p:ext uri="{BB962C8B-B14F-4D97-AF65-F5344CB8AC3E}">
@@ -3039,6 +3462,14 @@
     <p:sldLayoutId id="2147483706" r:id="rId10"/>
     <p:sldLayoutId id="2147483707" r:id="rId11"/>
   </p:sldLayoutIdLst>
+  <p:timing>
+    <p:tnLst>
+      <p:par>
+        <p:cTn id="1" dur="indefinite" restart="never" nodeType="tmRoot"/>
+      </p:par>
+    </p:tnLst>
+  </p:timing>
+  <p:hf hdr="0" ftr="0" dt="0"/>
   <p:txStyles>
     <p:titleStyle>
       <a:lvl1pPr algn="l" defTabSz="914400" rtl="0" eaLnBrk="1" latinLnBrk="0" hangingPunct="1">
@@ -3395,6 +3826,29 @@
           </a:p>
         </p:txBody>
       </p:sp>
+      <p:sp>
+        <p:nvSpPr>
+          <p:cNvPr id="4" name="Slide Number Placeholder 3"/>
+          <p:cNvSpPr>
+            <a:spLocks noGrp="1"/>
+          </p:cNvSpPr>
+          <p:nvPr>
+            <p:ph type="sldNum" sz="quarter" idx="12"/>
+          </p:nvPr>
+        </p:nvSpPr>
+        <p:spPr/>
+        <p:txBody>
+          <a:bodyPr/>
+          <a:lstStyle/>
+          <a:p>
+            <a:fld id="{0D14E344-43A7-4D61-B7CB-7B7571C47B84}" type="slidenum">
+              <a:rPr lang="en-US" smtClean="0"/>
+              <a:t>1</a:t>
+            </a:fld>
+            <a:endParaRPr lang="en-US"/>
+          </a:p>
+        </p:txBody>
+      </p:sp>
     </p:spTree>
     <p:extLst>
       <p:ext uri="{BB962C8B-B14F-4D97-AF65-F5344CB8AC3E}">
@@ -3405,6 +3859,13 @@
   <p:clrMapOvr>
     <a:masterClrMapping/>
   </p:clrMapOvr>
+  <p:timing>
+    <p:tnLst>
+      <p:par>
+        <p:cTn id="1" dur="indefinite" restart="never" nodeType="tmRoot"/>
+      </p:par>
+    </p:tnLst>
+  </p:timing>
 </p:sld>
 </file>
 
@@ -3430,6 +3891,116 @@
           <p:cNvPr id="2" name="Title 1">
             <a:extLst>
               <a:ext uri="{FF2B5EF4-FFF2-40B4-BE49-F238E27FC236}">
+                <a16:creationId xmlns:a16="http://schemas.microsoft.com/office/drawing/2014/main" id="{B0CFB2A9-782A-4580-BC98-13BC1976EDD1}"/>
+              </a:ext>
+            </a:extLst>
+          </p:cNvPr>
+          <p:cNvSpPr>
+            <a:spLocks noGrp="1"/>
+          </p:cNvSpPr>
+          <p:nvPr>
+            <p:ph type="title"/>
+          </p:nvPr>
+        </p:nvSpPr>
+        <p:spPr/>
+        <p:txBody>
+          <a:bodyPr/>
+          <a:lstStyle/>
+          <a:p>
+            <a:r>
+              <a:rPr lang="en-US" dirty="0"/>
+              <a:t>Results</a:t>
+            </a:r>
+          </a:p>
+        </p:txBody>
+      </p:sp>
+      <p:sp>
+        <p:nvSpPr>
+          <p:cNvPr id="3" name="Content Placeholder 2">
+            <a:extLst>
+              <a:ext uri="{FF2B5EF4-FFF2-40B4-BE49-F238E27FC236}">
+                <a16:creationId xmlns:a16="http://schemas.microsoft.com/office/drawing/2014/main" id="{A36212B8-B021-4872-B27E-86C4647A9FF1}"/>
+              </a:ext>
+            </a:extLst>
+          </p:cNvPr>
+          <p:cNvSpPr>
+            <a:spLocks noGrp="1"/>
+          </p:cNvSpPr>
+          <p:nvPr>
+            <p:ph idx="1"/>
+          </p:nvPr>
+        </p:nvSpPr>
+        <p:spPr/>
+        <p:txBody>
+          <a:bodyPr/>
+          <a:lstStyle/>
+          <a:p>
+            <a:r>
+              <a:rPr lang="en-US" dirty="0"/>
+              <a:t>We don’t have these yet lol</a:t>
+            </a:r>
+          </a:p>
+        </p:txBody>
+      </p:sp>
+      <p:sp>
+        <p:nvSpPr>
+          <p:cNvPr id="4" name="Slide Number Placeholder 3"/>
+          <p:cNvSpPr>
+            <a:spLocks noGrp="1"/>
+          </p:cNvSpPr>
+          <p:nvPr>
+            <p:ph type="sldNum" sz="quarter" idx="12"/>
+          </p:nvPr>
+        </p:nvSpPr>
+        <p:spPr/>
+        <p:txBody>
+          <a:bodyPr/>
+          <a:lstStyle/>
+          <a:p>
+            <a:fld id="{0D14E344-43A7-4D61-B7CB-7B7571C47B84}" type="slidenum">
+              <a:rPr lang="en-US" smtClean="0"/>
+              <a:pPr/>
+              <a:t>10</a:t>
+            </a:fld>
+            <a:endParaRPr lang="en-US" dirty="0"/>
+          </a:p>
+        </p:txBody>
+      </p:sp>
+    </p:spTree>
+    <p:extLst>
+      <p:ext uri="{BB962C8B-B14F-4D97-AF65-F5344CB8AC3E}">
+        <p14:creationId xmlns:p14="http://schemas.microsoft.com/office/powerpoint/2010/main" val="623138265"/>
+      </p:ext>
+    </p:extLst>
+  </p:cSld>
+  <p:clrMapOvr>
+    <a:masterClrMapping/>
+  </p:clrMapOvr>
+</p:sld>
+</file>
+
+<file path=ppt/slides/slide11.xml><?xml version="1.0" encoding="utf-8"?>
+<p:sld xmlns:a="http://schemas.openxmlformats.org/drawingml/2006/main" xmlns:r="http://schemas.openxmlformats.org/officeDocument/2006/relationships" xmlns:p="http://schemas.openxmlformats.org/presentationml/2006/main">
+  <p:cSld>
+    <p:spTree>
+      <p:nvGrpSpPr>
+        <p:cNvPr id="1" name=""/>
+        <p:cNvGrpSpPr/>
+        <p:nvPr/>
+      </p:nvGrpSpPr>
+      <p:grpSpPr>
+        <a:xfrm>
+          <a:off x="0" y="0"/>
+          <a:ext cx="0" cy="0"/>
+          <a:chOff x="0" y="0"/>
+          <a:chExt cx="0" cy="0"/>
+        </a:xfrm>
+      </p:grpSpPr>
+      <p:sp>
+        <p:nvSpPr>
+          <p:cNvPr id="2" name="Title 1">
+            <a:extLst>
+              <a:ext uri="{FF2B5EF4-FFF2-40B4-BE49-F238E27FC236}">
                 <a16:creationId xmlns:a16="http://schemas.microsoft.com/office/drawing/2014/main" id="{7D90C493-C170-442D-9154-AB1D6BA5392D}"/>
               </a:ext>
             </a:extLst>
@@ -3478,6 +4049,30 @@
               <a:rPr lang="en-US" dirty="0"/>
               <a:t>Remaining questions, things we hope to achieve, etc.</a:t>
             </a:r>
+          </a:p>
+        </p:txBody>
+      </p:sp>
+      <p:sp>
+        <p:nvSpPr>
+          <p:cNvPr id="4" name="Slide Number Placeholder 3"/>
+          <p:cNvSpPr>
+            <a:spLocks noGrp="1"/>
+          </p:cNvSpPr>
+          <p:nvPr>
+            <p:ph type="sldNum" sz="quarter" idx="12"/>
+          </p:nvPr>
+        </p:nvSpPr>
+        <p:spPr/>
+        <p:txBody>
+          <a:bodyPr/>
+          <a:lstStyle/>
+          <a:p>
+            <a:fld id="{0D14E344-43A7-4D61-B7CB-7B7571C47B84}" type="slidenum">
+              <a:rPr lang="en-US" smtClean="0"/>
+              <a:pPr/>
+              <a:t>11</a:t>
+            </a:fld>
+            <a:endParaRPr lang="en-US" dirty="0"/>
           </a:p>
         </p:txBody>
       </p:sp>
@@ -3593,6 +4188,30 @@
           </a:p>
         </p:txBody>
       </p:sp>
+      <p:sp>
+        <p:nvSpPr>
+          <p:cNvPr id="4" name="Slide Number Placeholder 3"/>
+          <p:cNvSpPr>
+            <a:spLocks noGrp="1"/>
+          </p:cNvSpPr>
+          <p:nvPr>
+            <p:ph type="sldNum" sz="quarter" idx="12"/>
+          </p:nvPr>
+        </p:nvSpPr>
+        <p:spPr/>
+        <p:txBody>
+          <a:bodyPr/>
+          <a:lstStyle/>
+          <a:p>
+            <a:fld id="{0D14E344-43A7-4D61-B7CB-7B7571C47B84}" type="slidenum">
+              <a:rPr lang="en-US" smtClean="0"/>
+              <a:pPr/>
+              <a:t>2</a:t>
+            </a:fld>
+            <a:endParaRPr lang="en-US" dirty="0"/>
+          </a:p>
+        </p:txBody>
+      </p:sp>
     </p:spTree>
     <p:extLst>
       <p:ext uri="{BB962C8B-B14F-4D97-AF65-F5344CB8AC3E}">
@@ -3603,6 +4222,13 @@
   <p:clrMapOvr>
     <a:masterClrMapping/>
   </p:clrMapOvr>
+  <p:timing>
+    <p:tnLst>
+      <p:par>
+        <p:cTn id="1" dur="indefinite" restart="never" nodeType="tmRoot"/>
+      </p:par>
+    </p:tnLst>
+  </p:timing>
 </p:sld>
 </file>
 
@@ -3702,6 +4328,30 @@
           </a:p>
         </p:txBody>
       </p:sp>
+      <p:sp>
+        <p:nvSpPr>
+          <p:cNvPr id="4" name="Slide Number Placeholder 3"/>
+          <p:cNvSpPr>
+            <a:spLocks noGrp="1"/>
+          </p:cNvSpPr>
+          <p:nvPr>
+            <p:ph type="sldNum" sz="quarter" idx="12"/>
+          </p:nvPr>
+        </p:nvSpPr>
+        <p:spPr/>
+        <p:txBody>
+          <a:bodyPr/>
+          <a:lstStyle/>
+          <a:p>
+            <a:fld id="{0D14E344-43A7-4D61-B7CB-7B7571C47B84}" type="slidenum">
+              <a:rPr lang="en-US" smtClean="0"/>
+              <a:pPr/>
+              <a:t>3</a:t>
+            </a:fld>
+            <a:endParaRPr lang="en-US" dirty="0"/>
+          </a:p>
+        </p:txBody>
+      </p:sp>
     </p:spTree>
     <p:extLst>
       <p:ext uri="{BB962C8B-B14F-4D97-AF65-F5344CB8AC3E}">
@@ -3712,6 +4362,13 @@
   <p:clrMapOvr>
     <a:masterClrMapping/>
   </p:clrMapOvr>
+  <p:timing>
+    <p:tnLst>
+      <p:par>
+        <p:cTn id="1" dur="indefinite" restart="never" nodeType="tmRoot"/>
+      </p:par>
+    </p:tnLst>
+  </p:timing>
 </p:sld>
 </file>
 
@@ -3839,6 +4496,30 @@
           </a:p>
         </p:txBody>
       </p:sp>
+      <p:sp>
+        <p:nvSpPr>
+          <p:cNvPr id="4" name="Slide Number Placeholder 3"/>
+          <p:cNvSpPr>
+            <a:spLocks noGrp="1"/>
+          </p:cNvSpPr>
+          <p:nvPr>
+            <p:ph type="sldNum" sz="quarter" idx="12"/>
+          </p:nvPr>
+        </p:nvSpPr>
+        <p:spPr/>
+        <p:txBody>
+          <a:bodyPr/>
+          <a:lstStyle/>
+          <a:p>
+            <a:fld id="{0D14E344-43A7-4D61-B7CB-7B7571C47B84}" type="slidenum">
+              <a:rPr lang="en-US" smtClean="0"/>
+              <a:pPr/>
+              <a:t>4</a:t>
+            </a:fld>
+            <a:endParaRPr lang="en-US" dirty="0"/>
+          </a:p>
+        </p:txBody>
+      </p:sp>
     </p:spTree>
     <p:extLst>
       <p:ext uri="{BB962C8B-B14F-4D97-AF65-F5344CB8AC3E}">
@@ -3849,6 +4530,13 @@
   <p:clrMapOvr>
     <a:masterClrMapping/>
   </p:clrMapOvr>
+  <p:timing>
+    <p:tnLst>
+      <p:par>
+        <p:cTn id="1" dur="indefinite" restart="never" nodeType="tmRoot"/>
+      </p:par>
+    </p:tnLst>
+  </p:timing>
 </p:sld>
 </file>
 
@@ -3937,6 +4625,60 @@
           </a:p>
         </p:txBody>
       </p:sp>
+      <p:sp>
+        <p:nvSpPr>
+          <p:cNvPr id="4" name="Slide Number Placeholder 3"/>
+          <p:cNvSpPr>
+            <a:spLocks noGrp="1"/>
+          </p:cNvSpPr>
+          <p:nvPr>
+            <p:ph type="sldNum" sz="quarter" idx="12"/>
+          </p:nvPr>
+        </p:nvSpPr>
+        <p:spPr/>
+        <p:txBody>
+          <a:bodyPr/>
+          <a:lstStyle/>
+          <a:p>
+            <a:fld id="{0D14E344-43A7-4D61-B7CB-7B7571C47B84}" type="slidenum">
+              <a:rPr lang="en-US" smtClean="0"/>
+              <a:pPr/>
+              <a:t>5</a:t>
+            </a:fld>
+            <a:endParaRPr lang="en-US" dirty="0"/>
+          </a:p>
+        </p:txBody>
+      </p:sp>
+      <p:pic>
+        <p:nvPicPr>
+          <p:cNvPr id="5" name="Picture 4"/>
+          <p:cNvPicPr>
+            <a:picLocks noChangeAspect="1"/>
+          </p:cNvPicPr>
+          <p:nvPr/>
+        </p:nvPicPr>
+        <p:blipFill>
+          <a:blip r:embed="rId2">
+            <a:extLst>
+              <a:ext uri="{28A0092B-C50C-407E-A947-70E740481C1C}">
+                <a14:useLocalDpi xmlns:a14="http://schemas.microsoft.com/office/drawing/2010/main" val="0"/>
+              </a:ext>
+            </a:extLst>
+          </a:blip>
+          <a:stretch>
+            <a:fillRect/>
+          </a:stretch>
+        </p:blipFill>
+        <p:spPr>
+          <a:xfrm>
+            <a:off x="838200" y="4613079"/>
+            <a:ext cx="7262066" cy="776629"/>
+          </a:xfrm>
+          <a:prstGeom prst="rect">
+            <a:avLst/>
+          </a:prstGeom>
+        </p:spPr>
+      </p:pic>
     </p:spTree>
     <p:extLst>
       <p:ext uri="{BB962C8B-B14F-4D97-AF65-F5344CB8AC3E}">
@@ -3947,6 +4689,13 @@
   <p:clrMapOvr>
     <a:masterClrMapping/>
   </p:clrMapOvr>
+  <p:timing>
+    <p:tnLst>
+      <p:par>
+        <p:cTn id="1" dur="indefinite" restart="never" nodeType="tmRoot"/>
+      </p:par>
+    </p:tnLst>
+  </p:timing>
 </p:sld>
 </file>
 
@@ -4032,6 +4781,30 @@
           </a:p>
         </p:txBody>
       </p:sp>
+      <p:sp>
+        <p:nvSpPr>
+          <p:cNvPr id="4" name="Slide Number Placeholder 3"/>
+          <p:cNvSpPr>
+            <a:spLocks noGrp="1"/>
+          </p:cNvSpPr>
+          <p:nvPr>
+            <p:ph type="sldNum" sz="quarter" idx="12"/>
+          </p:nvPr>
+        </p:nvSpPr>
+        <p:spPr/>
+        <p:txBody>
+          <a:bodyPr/>
+          <a:lstStyle/>
+          <a:p>
+            <a:fld id="{0D14E344-43A7-4D61-B7CB-7B7571C47B84}" type="slidenum">
+              <a:rPr lang="en-US" smtClean="0"/>
+              <a:pPr/>
+              <a:t>6</a:t>
+            </a:fld>
+            <a:endParaRPr lang="en-US" dirty="0"/>
+          </a:p>
+        </p:txBody>
+      </p:sp>
     </p:spTree>
     <p:extLst>
       <p:ext uri="{BB962C8B-B14F-4D97-AF65-F5344CB8AC3E}">
@@ -4042,6 +4815,13 @@
   <p:clrMapOvr>
     <a:masterClrMapping/>
   </p:clrMapOvr>
+  <p:timing>
+    <p:tnLst>
+      <p:par>
+        <p:cTn id="1" dur="indefinite" restart="never" nodeType="tmRoot"/>
+      </p:par>
+    </p:tnLst>
+  </p:timing>
 </p:sld>
 </file>
 
@@ -4084,9 +4864,10 @@
           <a:lstStyle/>
           <a:p>
             <a:r>
-              <a:rPr lang="en-US" dirty="0"/>
-              <a:t>A Compressive Sensing approach</a:t>
-            </a:r>
+              <a:rPr lang="en-US" dirty="0" smtClean="0"/>
+              <a:t>Blind Source Separation</a:t>
+            </a:r>
+            <a:endParaRPr lang="en-US" dirty="0"/>
           </a:p>
         </p:txBody>
       </p:sp>
@@ -4134,6 +4915,90 @@
           </a:p>
         </p:txBody>
       </p:sp>
+      <p:sp>
+        <p:nvSpPr>
+          <p:cNvPr id="4" name="Slide Number Placeholder 3"/>
+          <p:cNvSpPr>
+            <a:spLocks noGrp="1"/>
+          </p:cNvSpPr>
+          <p:nvPr>
+            <p:ph type="sldNum" sz="quarter" idx="12"/>
+          </p:nvPr>
+        </p:nvSpPr>
+        <p:spPr/>
+        <p:txBody>
+          <a:bodyPr/>
+          <a:lstStyle/>
+          <a:p>
+            <a:fld id="{0D14E344-43A7-4D61-B7CB-7B7571C47B84}" type="slidenum">
+              <a:rPr lang="en-US" smtClean="0"/>
+              <a:pPr/>
+              <a:t>7</a:t>
+            </a:fld>
+            <a:endParaRPr lang="en-US" dirty="0"/>
+          </a:p>
+        </p:txBody>
+      </p:sp>
+      <p:pic>
+        <p:nvPicPr>
+          <p:cNvPr id="5" name="Picture 4"/>
+          <p:cNvPicPr>
+            <a:picLocks noChangeAspect="1"/>
+          </p:cNvPicPr>
+          <p:nvPr/>
+        </p:nvPicPr>
+        <p:blipFill>
+          <a:blip r:embed="rId2">
+            <a:extLst>
+              <a:ext uri="{28A0092B-C50C-407E-A947-70E740481C1C}">
+                <a14:useLocalDpi xmlns:a14="http://schemas.microsoft.com/office/drawing/2010/main" val="0"/>
+              </a:ext>
+            </a:extLst>
+          </a:blip>
+          <a:stretch>
+            <a:fillRect/>
+          </a:stretch>
+        </p:blipFill>
+        <p:spPr>
+          <a:xfrm>
+            <a:off x="1273629" y="3108620"/>
+            <a:ext cx="2751823" cy="541464"/>
+          </a:xfrm>
+          <a:prstGeom prst="rect">
+            <a:avLst/>
+          </a:prstGeom>
+        </p:spPr>
+      </p:pic>
+      <p:pic>
+        <p:nvPicPr>
+          <p:cNvPr id="6" name="Picture 5"/>
+          <p:cNvPicPr>
+            <a:picLocks noChangeAspect="1"/>
+          </p:cNvPicPr>
+          <p:nvPr/>
+        </p:nvPicPr>
+        <p:blipFill>
+          <a:blip r:embed="rId3">
+            <a:extLst>
+              <a:ext uri="{28A0092B-C50C-407E-A947-70E740481C1C}">
+                <a14:useLocalDpi xmlns:a14="http://schemas.microsoft.com/office/drawing/2010/main" val="0"/>
+              </a:ext>
+            </a:extLst>
+          </a:blip>
+          <a:stretch>
+            <a:fillRect/>
+          </a:stretch>
+        </p:blipFill>
+        <p:spPr>
+          <a:xfrm>
+            <a:off x="2833007" y="3906164"/>
+            <a:ext cx="2660678" cy="511362"/>
+          </a:xfrm>
+          <a:prstGeom prst="rect">
+            <a:avLst/>
+          </a:prstGeom>
+        </p:spPr>
+      </p:pic>
     </p:spTree>
     <p:extLst>
       <p:ext uri="{BB962C8B-B14F-4D97-AF65-F5344CB8AC3E}">
@@ -4144,6 +5009,13 @@
   <p:clrMapOvr>
     <a:masterClrMapping/>
   </p:clrMapOvr>
+  <p:timing>
+    <p:tnLst>
+      <p:par>
+        <p:cTn id="1" dur="indefinite" restart="never" nodeType="tmRoot"/>
+      </p:par>
+    </p:tnLst>
+  </p:timing>
 </p:sld>
 </file>
 
@@ -4166,13 +5038,7 @@
       </p:grpSpPr>
       <p:sp>
         <p:nvSpPr>
-          <p:cNvPr id="2" name="Title 1">
-            <a:extLst>
-              <a:ext uri="{FF2B5EF4-FFF2-40B4-BE49-F238E27FC236}">
-                <a16:creationId xmlns:a16="http://schemas.microsoft.com/office/drawing/2014/main" id="{E440053D-501A-495F-ADDB-4A2E3291553C}"/>
-              </a:ext>
-            </a:extLst>
-          </p:cNvPr>
+          <p:cNvPr id="2" name="Title 1"/>
           <p:cNvSpPr>
             <a:spLocks noGrp="1"/>
           </p:cNvSpPr>
@@ -4185,57 +5051,171 @@
           <a:bodyPr/>
           <a:lstStyle/>
           <a:p>
-            <a:r>
-              <a:rPr lang="en-US" dirty="0"/>
-              <a:t>Approach</a:t>
-            </a:r>
-          </a:p>
-        </p:txBody>
-      </p:sp>
-      <p:sp>
-        <p:nvSpPr>
-          <p:cNvPr id="3" name="Content Placeholder 2">
-            <a:extLst>
-              <a:ext uri="{FF2B5EF4-FFF2-40B4-BE49-F238E27FC236}">
-                <a16:creationId xmlns:a16="http://schemas.microsoft.com/office/drawing/2014/main" id="{7D4A5B65-93E4-4C20-8FDC-F743C77C91BF}"/>
-              </a:ext>
-            </a:extLst>
-          </p:cNvPr>
-          <p:cNvSpPr>
-            <a:spLocks noGrp="1"/>
-          </p:cNvSpPr>
-          <p:nvPr>
-            <p:ph idx="1"/>
-          </p:nvPr>
-        </p:nvSpPr>
-        <p:spPr/>
-        <p:txBody>
-          <a:bodyPr/>
-          <a:lstStyle/>
-          <a:p>
-            <a:r>
-              <a:rPr lang="en-US" dirty="0"/>
-              <a:t>ICA on Frequency Domain of source signal.</a:t>
-            </a:r>
-          </a:p>
-          <a:p>
-            <a:r>
-              <a:rPr lang="en-US" dirty="0"/>
-              <a:t>Math happens here </a:t>
-            </a:r>
-          </a:p>
-        </p:txBody>
-      </p:sp>
+            <a:endParaRPr lang="en-US"/>
+          </a:p>
+        </p:txBody>
+      </p:sp>
+      <p:sp>
+        <p:nvSpPr>
+          <p:cNvPr id="4" name="Slide Number Placeholder 3"/>
+          <p:cNvSpPr>
+            <a:spLocks noGrp="1"/>
+          </p:cNvSpPr>
+          <p:nvPr>
+            <p:ph type="sldNum" sz="quarter" idx="12"/>
+          </p:nvPr>
+        </p:nvSpPr>
+        <p:spPr/>
+        <p:txBody>
+          <a:bodyPr/>
+          <a:lstStyle/>
+          <a:p>
+            <a:fld id="{0D14E344-43A7-4D61-B7CB-7B7571C47B84}" type="slidenum">
+              <a:rPr lang="en-US" smtClean="0"/>
+              <a:pPr/>
+              <a:t>8</a:t>
+            </a:fld>
+            <a:endParaRPr lang="en-US" dirty="0"/>
+          </a:p>
+        </p:txBody>
+      </p:sp>
+      <p:pic>
+        <p:nvPicPr>
+          <p:cNvPr id="6" name="Picture 5"/>
+          <p:cNvPicPr>
+            <a:picLocks noChangeAspect="1"/>
+          </p:cNvPicPr>
+          <p:nvPr/>
+        </p:nvPicPr>
+        <p:blipFill>
+          <a:blip r:embed="rId2">
+            <a:extLst>
+              <a:ext uri="{28A0092B-C50C-407E-A947-70E740481C1C}">
+                <a14:useLocalDpi xmlns:a14="http://schemas.microsoft.com/office/drawing/2010/main" val="0"/>
+              </a:ext>
+            </a:extLst>
+          </a:blip>
+          <a:stretch>
+            <a:fillRect/>
+          </a:stretch>
+        </p:blipFill>
+        <p:spPr>
+          <a:xfrm>
+            <a:off x="1134835" y="1825625"/>
+            <a:ext cx="4710917" cy="1304949"/>
+          </a:xfrm>
+          <a:prstGeom prst="rect">
+            <a:avLst/>
+          </a:prstGeom>
+        </p:spPr>
+      </p:pic>
+      <p:pic>
+        <p:nvPicPr>
+          <p:cNvPr id="9" name="Picture 8"/>
+          <p:cNvPicPr>
+            <a:picLocks noChangeAspect="1"/>
+          </p:cNvPicPr>
+          <p:nvPr/>
+        </p:nvPicPr>
+        <p:blipFill>
+          <a:blip r:embed="rId3">
+            <a:extLst>
+              <a:ext uri="{28A0092B-C50C-407E-A947-70E740481C1C}">
+                <a14:useLocalDpi xmlns:a14="http://schemas.microsoft.com/office/drawing/2010/main" val="0"/>
+              </a:ext>
+            </a:extLst>
+          </a:blip>
+          <a:stretch>
+            <a:fillRect/>
+          </a:stretch>
+        </p:blipFill>
+        <p:spPr>
+          <a:xfrm>
+            <a:off x="1134835" y="3488910"/>
+            <a:ext cx="2304762" cy="495238"/>
+          </a:xfrm>
+          <a:prstGeom prst="rect">
+            <a:avLst/>
+          </a:prstGeom>
+        </p:spPr>
+      </p:pic>
+      <p:pic>
+        <p:nvPicPr>
+          <p:cNvPr id="10" name="Picture 9"/>
+          <p:cNvPicPr>
+            <a:picLocks noChangeAspect="1"/>
+          </p:cNvPicPr>
+          <p:nvPr/>
+        </p:nvPicPr>
+        <p:blipFill>
+          <a:blip r:embed="rId4">
+            <a:extLst>
+              <a:ext uri="{28A0092B-C50C-407E-A947-70E740481C1C}">
+                <a14:useLocalDpi xmlns:a14="http://schemas.microsoft.com/office/drawing/2010/main" val="0"/>
+              </a:ext>
+            </a:extLst>
+          </a:blip>
+          <a:stretch>
+            <a:fillRect/>
+          </a:stretch>
+        </p:blipFill>
+        <p:spPr>
+          <a:xfrm>
+            <a:off x="1134835" y="4340102"/>
+            <a:ext cx="2552381" cy="638095"/>
+          </a:xfrm>
+          <a:prstGeom prst="rect">
+            <a:avLst/>
+          </a:prstGeom>
+        </p:spPr>
+      </p:pic>
+      <p:pic>
+        <p:nvPicPr>
+          <p:cNvPr id="11" name="Picture 10"/>
+          <p:cNvPicPr>
+            <a:picLocks noChangeAspect="1"/>
+          </p:cNvPicPr>
+          <p:nvPr/>
+        </p:nvPicPr>
+        <p:blipFill>
+          <a:blip r:embed="rId5">
+            <a:extLst>
+              <a:ext uri="{28A0092B-C50C-407E-A947-70E740481C1C}">
+                <a14:useLocalDpi xmlns:a14="http://schemas.microsoft.com/office/drawing/2010/main" val="0"/>
+              </a:ext>
+            </a:extLst>
+          </a:blip>
+          <a:stretch>
+            <a:fillRect/>
+          </a:stretch>
+        </p:blipFill>
+        <p:spPr>
+          <a:xfrm>
+            <a:off x="1134835" y="5334151"/>
+            <a:ext cx="2980952" cy="619048"/>
+          </a:xfrm>
+          <a:prstGeom prst="rect">
+            <a:avLst/>
+          </a:prstGeom>
+        </p:spPr>
+      </p:pic>
     </p:spTree>
     <p:extLst>
       <p:ext uri="{BB962C8B-B14F-4D97-AF65-F5344CB8AC3E}">
-        <p14:creationId xmlns:p14="http://schemas.microsoft.com/office/powerpoint/2010/main" val="1723405738"/>
+        <p14:creationId xmlns:p14="http://schemas.microsoft.com/office/powerpoint/2010/main" val="1664304620"/>
       </p:ext>
     </p:extLst>
   </p:cSld>
   <p:clrMapOvr>
     <a:masterClrMapping/>
   </p:clrMapOvr>
+  <p:timing>
+    <p:tnLst>
+      <p:par>
+        <p:cTn id="1" dur="indefinite" restart="never" nodeType="tmRoot"/>
+      </p:par>
+    </p:tnLst>
+  </p:timing>
 </p:sld>
 </file>
 
@@ -4261,7 +5241,7 @@
           <p:cNvPr id="2" name="Title 1">
             <a:extLst>
               <a:ext uri="{FF2B5EF4-FFF2-40B4-BE49-F238E27FC236}">
-                <a16:creationId xmlns:a16="http://schemas.microsoft.com/office/drawing/2014/main" id="{B0CFB2A9-782A-4580-BC98-13BC1976EDD1}"/>
+                <a16:creationId xmlns:a16="http://schemas.microsoft.com/office/drawing/2014/main" id="{E440053D-501A-495F-ADDB-4A2E3291553C}"/>
               </a:ext>
             </a:extLst>
           </p:cNvPr>
@@ -4279,7 +5259,7 @@
           <a:p>
             <a:r>
               <a:rPr lang="en-US" dirty="0"/>
-              <a:t>Results</a:t>
+              <a:t>Approach</a:t>
             </a:r>
           </a:p>
         </p:txBody>
@@ -4289,7 +5269,7 @@
           <p:cNvPr id="3" name="Content Placeholder 2">
             <a:extLst>
               <a:ext uri="{FF2B5EF4-FFF2-40B4-BE49-F238E27FC236}">
-                <a16:creationId xmlns:a16="http://schemas.microsoft.com/office/drawing/2014/main" id="{A36212B8-B021-4872-B27E-86C4647A9FF1}"/>
+                <a16:creationId xmlns:a16="http://schemas.microsoft.com/office/drawing/2014/main" id="{7D4A5B65-93E4-4C20-8FDC-F743C77C91BF}"/>
               </a:ext>
             </a:extLst>
           </p:cNvPr>
@@ -4306,22 +5286,112 @@
           <a:lstStyle/>
           <a:p>
             <a:r>
-              <a:rPr lang="en-US" dirty="0"/>
-              <a:t>We don’t have these yet lol</a:t>
-            </a:r>
+              <a:rPr lang="en-US" dirty="0" smtClean="0"/>
+              <a:t>ICA to find M</a:t>
+            </a:r>
+            <a:endParaRPr lang="en-US" dirty="0"/>
+          </a:p>
+        </p:txBody>
+      </p:sp>
+      <p:pic>
+        <p:nvPicPr>
+          <p:cNvPr id="5" name="Picture 4"/>
+          <p:cNvPicPr>
+            <a:picLocks noChangeAspect="1"/>
+          </p:cNvPicPr>
+          <p:nvPr/>
+        </p:nvPicPr>
+        <p:blipFill>
+          <a:blip r:embed="rId2"/>
+          <a:stretch>
+            <a:fillRect/>
+          </a:stretch>
+        </p:blipFill>
+        <p:spPr>
+          <a:xfrm>
+            <a:off x="5861280" y="857250"/>
+            <a:ext cx="4722242" cy="5082084"/>
+          </a:xfrm>
+          <a:prstGeom prst="rect">
+            <a:avLst/>
+          </a:prstGeom>
+        </p:spPr>
+      </p:pic>
+      <p:sp>
+        <p:nvSpPr>
+          <p:cNvPr id="6" name="TextBox 5"/>
+          <p:cNvSpPr txBox="1"/>
+          <p:nvPr/>
+        </p:nvSpPr>
+        <p:spPr>
+          <a:xfrm>
+            <a:off x="5926594" y="6176963"/>
+            <a:ext cx="4743450" cy="246221"/>
+          </a:xfrm>
+          <a:prstGeom prst="rect">
+            <a:avLst/>
+          </a:prstGeom>
+          <a:noFill/>
+        </p:spPr>
+        <p:txBody>
+          <a:bodyPr wrap="square" rtlCol="0">
+            <a:spAutoFit/>
+          </a:bodyPr>
+          <a:lstStyle/>
+          <a:p>
+            <a:r>
+              <a:rPr lang="en-US" sz="1000" dirty="0" err="1" smtClean="0"/>
+              <a:t>Bao</a:t>
+            </a:r>
+            <a:r>
+              <a:rPr lang="en-US" sz="1000" dirty="0" smtClean="0"/>
+              <a:t> G, Ye Z, Xu X, Zhou Y. IEE Transactions on Audio, Speech, and Language Processing </a:t>
+            </a:r>
+            <a:endParaRPr lang="en-US" sz="1000" dirty="0"/>
+          </a:p>
+        </p:txBody>
+      </p:sp>
+      <p:sp>
+        <p:nvSpPr>
+          <p:cNvPr id="7" name="Slide Number Placeholder 6"/>
+          <p:cNvSpPr>
+            <a:spLocks noGrp="1"/>
+          </p:cNvSpPr>
+          <p:nvPr>
+            <p:ph type="sldNum" sz="quarter" idx="12"/>
+          </p:nvPr>
+        </p:nvSpPr>
+        <p:spPr/>
+        <p:txBody>
+          <a:bodyPr/>
+          <a:lstStyle/>
+          <a:p>
+            <a:fld id="{0D14E344-43A7-4D61-B7CB-7B7571C47B84}" type="slidenum">
+              <a:rPr lang="en-US" smtClean="0"/>
+              <a:pPr/>
+              <a:t>9</a:t>
+            </a:fld>
+            <a:endParaRPr lang="en-US" dirty="0"/>
           </a:p>
         </p:txBody>
       </p:sp>
     </p:spTree>
     <p:extLst>
       <p:ext uri="{BB962C8B-B14F-4D97-AF65-F5344CB8AC3E}">
-        <p14:creationId xmlns:p14="http://schemas.microsoft.com/office/powerpoint/2010/main" val="623138265"/>
+        <p14:creationId xmlns:p14="http://schemas.microsoft.com/office/powerpoint/2010/main" val="1723405738"/>
       </p:ext>
     </p:extLst>
   </p:cSld>
   <p:clrMapOvr>
     <a:masterClrMapping/>
   </p:clrMapOvr>
+  <p:timing>
+    <p:tnLst>
+      <p:par>
+        <p:cTn id="1" dur="indefinite" restart="never" nodeType="tmRoot"/>
+      </p:par>
+    </p:tnLst>
+  </p:timing>
 </p:sld>
 </file>
 
@@ -4618,4 +5688,265 @@
     </a:ext>
   </a:extLst>
 </a:theme>
+</file>
+
+<file path=ppt/theme/theme2.xml><?xml version="1.0" encoding="utf-8"?>
+<a:theme xmlns:a="http://schemas.openxmlformats.org/drawingml/2006/main" name="Office Theme">
+  <a:themeElements>
+    <a:clrScheme name="Office">
+      <a:dk1>
+        <a:sysClr val="windowText" lastClr="000000"/>
+      </a:dk1>
+      <a:lt1>
+        <a:sysClr val="window" lastClr="FFFFFF"/>
+      </a:lt1>
+      <a:dk2>
+        <a:srgbClr val="44546A"/>
+      </a:dk2>
+      <a:lt2>
+        <a:srgbClr val="E7E6E6"/>
+      </a:lt2>
+      <a:accent1>
+        <a:srgbClr val="5B9BD5"/>
+      </a:accent1>
+      <a:accent2>
+        <a:srgbClr val="ED7D31"/>
+      </a:accent2>
+      <a:accent3>
+        <a:srgbClr val="A5A5A5"/>
+      </a:accent3>
+      <a:accent4>
+        <a:srgbClr val="FFC000"/>
+      </a:accent4>
+      <a:accent5>
+        <a:srgbClr val="4472C4"/>
+      </a:accent5>
+      <a:accent6>
+        <a:srgbClr val="70AD47"/>
+      </a:accent6>
+      <a:hlink>
+        <a:srgbClr val="0563C1"/>
+      </a:hlink>
+      <a:folHlink>
+        <a:srgbClr val="954F72"/>
+      </a:folHlink>
+    </a:clrScheme>
+    <a:fontScheme name="Office">
+      <a:majorFont>
+        <a:latin typeface="Calibri Light" panose="020F0302020204030204"/>
+        <a:ea typeface=""/>
+        <a:cs typeface=""/>
+        <a:font script="Jpan" typeface="游ゴシック Light"/>
+        <a:font script="Hang" typeface="맑은 고딕"/>
+        <a:font script="Hans" typeface="等线 Light"/>
+        <a:font script="Hant" typeface="新細明體"/>
+        <a:font script="Arab" typeface="Times New Roman"/>
+        <a:font script="Hebr" typeface="Times New Roman"/>
+        <a:font script="Thai" typeface="Angsana New"/>
+        <a:font script="Ethi" typeface="Nyala"/>
+        <a:font script="Beng" typeface="Vrinda"/>
+        <a:font script="Gujr" typeface="Shruti"/>
+        <a:font script="Khmr" typeface="MoolBoran"/>
+        <a:font script="Knda" typeface="Tunga"/>
+        <a:font script="Guru" typeface="Raavi"/>
+        <a:font script="Cans" typeface="Euphemia"/>
+        <a:font script="Cher" typeface="Plantagenet Cherokee"/>
+        <a:font script="Yiii" typeface="Microsoft Yi Baiti"/>
+        <a:font script="Tibt" typeface="Microsoft Himalaya"/>
+        <a:font script="Thaa" typeface="MV Boli"/>
+        <a:font script="Deva" typeface="Mangal"/>
+        <a:font script="Telu" typeface="Gautami"/>
+        <a:font script="Taml" typeface="Latha"/>
+        <a:font script="Syrc" typeface="Estrangelo Edessa"/>
+        <a:font script="Orya" typeface="Kalinga"/>
+        <a:font script="Mlym" typeface="Kartika"/>
+        <a:font script="Laoo" typeface="DokChampa"/>
+        <a:font script="Sinh" typeface="Iskoola Pota"/>
+        <a:font script="Mong" typeface="Mongolian Baiti"/>
+        <a:font script="Viet" typeface="Times New Roman"/>
+        <a:font script="Uigh" typeface="Microsoft Uighur"/>
+        <a:font script="Geor" typeface="Sylfaen"/>
+      </a:majorFont>
+      <a:minorFont>
+        <a:latin typeface="Calibri" panose="020F0502020204030204"/>
+        <a:ea typeface=""/>
+        <a:cs typeface=""/>
+        <a:font script="Jpan" typeface="游ゴシック"/>
+        <a:font script="Hang" typeface="맑은 고딕"/>
+        <a:font script="Hans" typeface="等线"/>
+        <a:font script="Hant" typeface="新細明體"/>
+        <a:font script="Arab" typeface="Arial"/>
+        <a:font script="Hebr" typeface="Arial"/>
+        <a:font script="Thai" typeface="Cordia New"/>
+        <a:font script="Ethi" typeface="Nyala"/>
+        <a:font script="Beng" typeface="Vrinda"/>
+        <a:font script="Gujr" typeface="Shruti"/>
+        <a:font script="Khmr" typeface="DaunPenh"/>
+        <a:font script="Knda" typeface="Tunga"/>
+        <a:font script="Guru" typeface="Raavi"/>
+        <a:font script="Cans" typeface="Euphemia"/>
+        <a:font script="Cher" typeface="Plantagenet Cherokee"/>
+        <a:font script="Yiii" typeface="Microsoft Yi Baiti"/>
+        <a:font script="Tibt" typeface="Microsoft Himalaya"/>
+        <a:font script="Thaa" typeface="MV Boli"/>
+        <a:font script="Deva" typeface="Mangal"/>
+        <a:font script="Telu" typeface="Gautami"/>
+        <a:font script="Taml" typeface="Latha"/>
+        <a:font script="Syrc" typeface="Estrangelo Edessa"/>
+        <a:font script="Orya" typeface="Kalinga"/>
+        <a:font script="Mlym" typeface="Kartika"/>
+        <a:font script="Laoo" typeface="DokChampa"/>
+        <a:font script="Sinh" typeface="Iskoola Pota"/>
+        <a:font script="Mong" typeface="Mongolian Baiti"/>
+        <a:font script="Viet" typeface="Arial"/>
+        <a:font script="Uigh" typeface="Microsoft Uighur"/>
+        <a:font script="Geor" typeface="Sylfaen"/>
+      </a:minorFont>
+    </a:fontScheme>
+    <a:fmtScheme name="Office">
+      <a:fillStyleLst>
+        <a:solidFill>
+          <a:schemeClr val="phClr"/>
+        </a:solidFill>
+        <a:gradFill rotWithShape="1">
+          <a:gsLst>
+            <a:gs pos="0">
+              <a:schemeClr val="phClr">
+                <a:lumMod val="110000"/>
+                <a:satMod val="105000"/>
+                <a:tint val="67000"/>
+              </a:schemeClr>
+            </a:gs>
+            <a:gs pos="50000">
+              <a:schemeClr val="phClr">
+                <a:lumMod val="105000"/>
+                <a:satMod val="103000"/>
+                <a:tint val="73000"/>
+              </a:schemeClr>
+            </a:gs>
+            <a:gs pos="100000">
+              <a:schemeClr val="phClr">
+                <a:lumMod val="105000"/>
+                <a:satMod val="109000"/>
+                <a:tint val="81000"/>
+              </a:schemeClr>
+            </a:gs>
+          </a:gsLst>
+          <a:lin ang="5400000" scaled="0"/>
+        </a:gradFill>
+        <a:gradFill rotWithShape="1">
+          <a:gsLst>
+            <a:gs pos="0">
+              <a:schemeClr val="phClr">
+                <a:satMod val="103000"/>
+                <a:lumMod val="102000"/>
+                <a:tint val="94000"/>
+              </a:schemeClr>
+            </a:gs>
+            <a:gs pos="50000">
+              <a:schemeClr val="phClr">
+                <a:satMod val="110000"/>
+                <a:lumMod val="100000"/>
+                <a:shade val="100000"/>
+              </a:schemeClr>
+            </a:gs>
+            <a:gs pos="100000">
+              <a:schemeClr val="phClr">
+                <a:lumMod val="99000"/>
+                <a:satMod val="120000"/>
+                <a:shade val="78000"/>
+              </a:schemeClr>
+            </a:gs>
+          </a:gsLst>
+          <a:lin ang="5400000" scaled="0"/>
+        </a:gradFill>
+      </a:fillStyleLst>
+      <a:lnStyleLst>
+        <a:ln w="6350" cap="flat" cmpd="sng" algn="ctr">
+          <a:solidFill>
+            <a:schemeClr val="phClr"/>
+          </a:solidFill>
+          <a:prstDash val="solid"/>
+          <a:miter lim="800000"/>
+        </a:ln>
+        <a:ln w="12700" cap="flat" cmpd="sng" algn="ctr">
+          <a:solidFill>
+            <a:schemeClr val="phClr"/>
+          </a:solidFill>
+          <a:prstDash val="solid"/>
+          <a:miter lim="800000"/>
+        </a:ln>
+        <a:ln w="19050" cap="flat" cmpd="sng" algn="ctr">
+          <a:solidFill>
+            <a:schemeClr val="phClr"/>
+          </a:solidFill>
+          <a:prstDash val="solid"/>
+          <a:miter lim="800000"/>
+        </a:ln>
+      </a:lnStyleLst>
+      <a:effectStyleLst>
+        <a:effectStyle>
+          <a:effectLst/>
+        </a:effectStyle>
+        <a:effectStyle>
+          <a:effectLst/>
+        </a:effectStyle>
+        <a:effectStyle>
+          <a:effectLst>
+            <a:outerShdw blurRad="57150" dist="19050" dir="5400000" algn="ctr" rotWithShape="0">
+              <a:srgbClr val="000000">
+                <a:alpha val="63000"/>
+              </a:srgbClr>
+            </a:outerShdw>
+          </a:effectLst>
+        </a:effectStyle>
+      </a:effectStyleLst>
+      <a:bgFillStyleLst>
+        <a:solidFill>
+          <a:schemeClr val="phClr"/>
+        </a:solidFill>
+        <a:solidFill>
+          <a:schemeClr val="phClr">
+            <a:tint val="95000"/>
+            <a:satMod val="170000"/>
+          </a:schemeClr>
+        </a:solidFill>
+        <a:gradFill rotWithShape="1">
+          <a:gsLst>
+            <a:gs pos="0">
+              <a:schemeClr val="phClr">
+                <a:tint val="93000"/>
+                <a:satMod val="150000"/>
+                <a:shade val="98000"/>
+                <a:lumMod val="102000"/>
+              </a:schemeClr>
+            </a:gs>
+            <a:gs pos="50000">
+              <a:schemeClr val="phClr">
+                <a:tint val="98000"/>
+                <a:satMod val="130000"/>
+                <a:shade val="90000"/>
+                <a:lumMod val="103000"/>
+              </a:schemeClr>
+            </a:gs>
+            <a:gs pos="100000">
+              <a:schemeClr val="phClr">
+                <a:shade val="63000"/>
+                <a:satMod val="120000"/>
+              </a:schemeClr>
+            </a:gs>
+          </a:gsLst>
+          <a:lin ang="5400000" scaled="0"/>
+        </a:gradFill>
+      </a:bgFillStyleLst>
+    </a:fmtScheme>
+  </a:themeElements>
+  <a:objectDefaults/>
+  <a:extraClrSchemeLst/>
+  <a:extLst>
+    <a:ext uri="{05A4C25C-085E-4340-85A3-A5531E510DB2}">
+      <thm15:themeFamily xmlns:thm15="http://schemas.microsoft.com/office/thememl/2012/main" name="Office Theme" id="{62F939B6-93AF-4DB8-9C6B-D6C7DFDC589F}" vid="{4A3C46E8-61CC-4603-A589-7422A47A8E4A}"/>
+    </a:ext>
+  </a:extLst>
+</a:theme>
 </file>
</xml_diff>

<commit_message>
Adds audio and edits to ppt
</commit_message>
<xml_diff>
--- a/slide/slides.pptx
+++ b/slide/slides.pptx
@@ -5,7 +5,7 @@
     <p:sldMasterId id="2147483696" r:id="rId1"/>
   </p:sldMasterIdLst>
   <p:notesMasterIdLst>
-    <p:notesMasterId r:id="rId11"/>
+    <p:notesMasterId r:id="rId12"/>
   </p:notesMasterIdLst>
   <p:sldIdLst>
     <p:sldId id="256" r:id="rId2"/>
@@ -14,9 +14,10 @@
     <p:sldId id="267" r:id="rId5"/>
     <p:sldId id="263" r:id="rId6"/>
     <p:sldId id="265" r:id="rId7"/>
-    <p:sldId id="268" r:id="rId8"/>
-    <p:sldId id="258" r:id="rId9"/>
-    <p:sldId id="269" r:id="rId10"/>
+    <p:sldId id="270" r:id="rId8"/>
+    <p:sldId id="268" r:id="rId9"/>
+    <p:sldId id="258" r:id="rId10"/>
+    <p:sldId id="269" r:id="rId11"/>
   </p:sldIdLst>
   <p:sldSz cx="12192000" cy="6858000"/>
   <p:notesSz cx="6858000" cy="9144000"/>
@@ -3821,6 +3822,130 @@
   <p:clrMapOvr>
     <a:masterClrMapping/>
   </p:clrMapOvr>
+  <p:timing>
+    <p:tnLst>
+      <p:par>
+        <p:cTn id="1" dur="indefinite" restart="never" nodeType="tmRoot"/>
+      </p:par>
+    </p:tnLst>
+  </p:timing>
+</p:sld>
+</file>
+
+<file path=ppt/slides/slide10.xml><?xml version="1.0" encoding="utf-8"?>
+<p:sld xmlns:a="http://schemas.openxmlformats.org/drawingml/2006/main" xmlns:r="http://schemas.openxmlformats.org/officeDocument/2006/relationships" xmlns:p="http://schemas.openxmlformats.org/presentationml/2006/main">
+  <p:cSld>
+    <p:spTree>
+      <p:nvGrpSpPr>
+        <p:cNvPr id="1" name=""/>
+        <p:cNvGrpSpPr/>
+        <p:nvPr/>
+      </p:nvGrpSpPr>
+      <p:grpSpPr>
+        <a:xfrm>
+          <a:off x="0" y="0"/>
+          <a:ext cx="0" cy="0"/>
+          <a:chOff x="0" y="0"/>
+          <a:chExt cx="0" cy="0"/>
+        </a:xfrm>
+      </p:grpSpPr>
+      <p:sp>
+        <p:nvSpPr>
+          <p:cNvPr id="2" name="Title 1">
+            <a:extLst>
+              <a:ext uri="{FF2B5EF4-FFF2-40B4-BE49-F238E27FC236}">
+                <a16:creationId xmlns:a16="http://schemas.microsoft.com/office/drawing/2014/main" id="{9C3895C8-84E8-490E-814D-7FD942AA0250}"/>
+              </a:ext>
+            </a:extLst>
+          </p:cNvPr>
+          <p:cNvSpPr>
+            <a:spLocks noGrp="1"/>
+          </p:cNvSpPr>
+          <p:nvPr>
+            <p:ph type="title"/>
+          </p:nvPr>
+        </p:nvSpPr>
+        <p:spPr/>
+        <p:txBody>
+          <a:bodyPr/>
+          <a:lstStyle/>
+          <a:p>
+            <a:r>
+              <a:rPr lang="en-US" dirty="0" err="1"/>
+              <a:t>Smashmouth</a:t>
+            </a:r>
+            <a:endParaRPr lang="en-US" dirty="0"/>
+          </a:p>
+        </p:txBody>
+      </p:sp>
+      <p:sp>
+        <p:nvSpPr>
+          <p:cNvPr id="3" name="Content Placeholder 2">
+            <a:extLst>
+              <a:ext uri="{FF2B5EF4-FFF2-40B4-BE49-F238E27FC236}">
+                <a16:creationId xmlns:a16="http://schemas.microsoft.com/office/drawing/2014/main" id="{ADA04467-F10A-443F-ACA2-CDE3E1035B6B}"/>
+              </a:ext>
+            </a:extLst>
+          </p:cNvPr>
+          <p:cNvSpPr>
+            <a:spLocks noGrp="1"/>
+          </p:cNvSpPr>
+          <p:nvPr>
+            <p:ph idx="1"/>
+          </p:nvPr>
+        </p:nvSpPr>
+        <p:spPr/>
+        <p:txBody>
+          <a:bodyPr/>
+          <a:lstStyle/>
+          <a:p>
+            <a:r>
+              <a:rPr lang="en-US" dirty="0"/>
+              <a:t>Question?</a:t>
+            </a:r>
+          </a:p>
+        </p:txBody>
+      </p:sp>
+      <p:sp>
+        <p:nvSpPr>
+          <p:cNvPr id="4" name="Slide Number Placeholder 3">
+            <a:extLst>
+              <a:ext uri="{FF2B5EF4-FFF2-40B4-BE49-F238E27FC236}">
+                <a16:creationId xmlns:a16="http://schemas.microsoft.com/office/drawing/2014/main" id="{EAA9769B-1222-49B8-BE31-76E5CC92B8A7}"/>
+              </a:ext>
+            </a:extLst>
+          </p:cNvPr>
+          <p:cNvSpPr>
+            <a:spLocks noGrp="1"/>
+          </p:cNvSpPr>
+          <p:nvPr>
+            <p:ph type="sldNum" sz="quarter" idx="12"/>
+          </p:nvPr>
+        </p:nvSpPr>
+        <p:spPr/>
+        <p:txBody>
+          <a:bodyPr/>
+          <a:lstStyle/>
+          <a:p>
+            <a:fld id="{0D14E344-43A7-4D61-B7CB-7B7571C47B84}" type="slidenum">
+              <a:rPr lang="en-US" smtClean="0"/>
+              <a:pPr/>
+              <a:t>10</a:t>
+            </a:fld>
+            <a:endParaRPr lang="en-US" dirty="0"/>
+          </a:p>
+        </p:txBody>
+      </p:sp>
+    </p:spTree>
+    <p:extLst>
+      <p:ext uri="{BB962C8B-B14F-4D97-AF65-F5344CB8AC3E}">
+        <p14:creationId xmlns:p14="http://schemas.microsoft.com/office/powerpoint/2010/main" val="781660832"/>
+      </p:ext>
+    </p:extLst>
+  </p:cSld>
+  <p:clrMapOvr>
+    <a:masterClrMapping/>
+  </p:clrMapOvr>
 </p:sld>
 </file>
 
@@ -3957,6 +4082,13 @@
   <p:clrMapOvr>
     <a:masterClrMapping/>
   </p:clrMapOvr>
+  <p:timing>
+    <p:tnLst>
+      <p:par>
+        <p:cTn id="1" dur="indefinite" restart="never" nodeType="tmRoot"/>
+      </p:par>
+    </p:tnLst>
+  </p:timing>
 </p:sld>
 </file>
 
@@ -4090,6 +4222,13 @@
   <p:clrMapOvr>
     <a:masterClrMapping/>
   </p:clrMapOvr>
+  <p:timing>
+    <p:tnLst>
+      <p:par>
+        <p:cTn id="1" dur="indefinite" restart="never" nodeType="tmRoot"/>
+      </p:par>
+    </p:tnLst>
+  </p:timing>
 </p:sld>
 </file>
 
@@ -4132,9 +4271,14 @@
           <a:lstStyle/>
           <a:p>
             <a:r>
-              <a:rPr lang="en-US" dirty="0"/>
-              <a:t>Description of Data</a:t>
-            </a:r>
+              <a:rPr lang="en-US" dirty="0" err="1" smtClean="0"/>
+              <a:t>Interspeech</a:t>
+            </a:r>
+            <a:r>
+              <a:rPr lang="en-US" dirty="0" smtClean="0"/>
+              <a:t> 2006 Data Set</a:t>
+            </a:r>
+            <a:endParaRPr lang="en-US" dirty="0"/>
           </a:p>
         </p:txBody>
       </p:sp>
@@ -4194,22 +4338,26 @@
           <a:p>
             <a:pPr lvl="1"/>
             <a:r>
+              <a:rPr lang="en-US" dirty="0" smtClean="0"/>
+              <a:t>Makes no demands on higher-level language processing</a:t>
+            </a:r>
+          </a:p>
+          <a:p>
+            <a:pPr lvl="1"/>
+            <a:r>
+              <a:rPr lang="en-US" dirty="0" smtClean="0"/>
+              <a:t>Highly varied</a:t>
+            </a:r>
+          </a:p>
+          <a:p>
+            <a:pPr lvl="2"/>
+            <a:r>
+              <a:rPr lang="en-US" dirty="0" smtClean="0"/>
+              <a:t>Allows </a:t>
+            </a:r>
+            <a:r>
               <a:rPr lang="en-US" dirty="0"/>
-              <a:t>Makes no demands on higher-level language processing</a:t>
-            </a:r>
-          </a:p>
-          <a:p>
-            <a:pPr lvl="1"/>
-            <a:r>
-              <a:rPr lang="en-US" dirty="0"/>
-              <a:t>Highly varied</a:t>
-            </a:r>
-          </a:p>
-          <a:p>
-            <a:pPr lvl="2"/>
-            <a:r>
-              <a:rPr lang="en-US" dirty="0"/>
-              <a:t>Allows for different combinations: Male/Female voices, Male/Male voices, etc.</a:t>
+              <a:t>for different combinations: Male/Female voices, Male/Male voices, etc.</a:t>
             </a:r>
           </a:p>
           <a:p>
@@ -4241,6 +4389,39 @@
           </a:p>
         </p:txBody>
       </p:sp>
+      <p:pic>
+        <p:nvPicPr>
+          <p:cNvPr id="7" name="t4_pwwk4a_m12_brae8s">
+            <a:hlinkClick r:id="" action="ppaction://media"/>
+          </p:cNvPr>
+          <p:cNvPicPr>
+            <a:picLocks noChangeAspect="1"/>
+          </p:cNvPicPr>
+          <p:nvPr>
+            <a:audioFile r:link="rId2"/>
+            <p:extLst>
+              <p:ext uri="{DAA4B4D4-6D71-4841-9C94-3DE7FCFB9230}">
+                <p14:media xmlns:p14="http://schemas.microsoft.com/office/powerpoint/2010/main" r:embed="rId1"/>
+              </p:ext>
+            </p:extLst>
+          </p:nvPr>
+        </p:nvPicPr>
+        <p:blipFill>
+          <a:blip r:embed="rId4"/>
+          <a:stretch>
+            <a:fillRect/>
+          </a:stretch>
+        </p:blipFill>
+        <p:spPr>
+          <a:xfrm>
+            <a:off x="5053263" y="2658979"/>
+            <a:ext cx="609600" cy="609600"/>
+          </a:xfrm>
+          <a:prstGeom prst="rect">
+            <a:avLst/>
+          </a:prstGeom>
+        </p:spPr>
+      </p:pic>
     </p:spTree>
     <p:extLst>
       <p:ext uri="{BB962C8B-B14F-4D97-AF65-F5344CB8AC3E}">
@@ -4251,6 +4432,93 @@
   <p:clrMapOvr>
     <a:masterClrMapping/>
   </p:clrMapOvr>
+  <p:timing>
+    <p:tnLst>
+      <p:par>
+        <p:cTn id="1" dur="indefinite" restart="never" nodeType="tmRoot">
+          <p:childTnLst>
+            <p:seq concurrent="1" nextAc="seek">
+              <p:cTn id="2" restart="whenNotActive" fill="hold" evtFilter="cancelBubble" nodeType="interactiveSeq">
+                <p:stCondLst>
+                  <p:cond evt="onClick" delay="0">
+                    <p:tgtEl>
+                      <p:spTgt spid="7"/>
+                    </p:tgtEl>
+                  </p:cond>
+                </p:stCondLst>
+                <p:endSync evt="end" delay="0">
+                  <p:rtn val="all"/>
+                </p:endSync>
+                <p:childTnLst>
+                  <p:par>
+                    <p:cTn id="3" fill="hold">
+                      <p:stCondLst>
+                        <p:cond delay="0"/>
+                      </p:stCondLst>
+                      <p:childTnLst>
+                        <p:par>
+                          <p:cTn id="4" fill="hold">
+                            <p:stCondLst>
+                              <p:cond delay="0"/>
+                            </p:stCondLst>
+                            <p:childTnLst>
+                              <p:par>
+                                <p:cTn id="5" presetID="1" presetClass="mediacall" presetSubtype="0" fill="hold" nodeType="clickEffect">
+                                  <p:stCondLst>
+                                    <p:cond delay="0"/>
+                                  </p:stCondLst>
+                                  <p:childTnLst>
+                                    <p:cmd type="call" cmd="playFrom(0.0)">
+                                      <p:cBhvr>
+                                        <p:cTn id="6" dur="2040" fill="hold"/>
+                                        <p:tgtEl>
+                                          <p:spTgt spid="7"/>
+                                        </p:tgtEl>
+                                      </p:cBhvr>
+                                    </p:cmd>
+                                  </p:childTnLst>
+                                </p:cTn>
+                              </p:par>
+                            </p:childTnLst>
+                          </p:cTn>
+                        </p:par>
+                      </p:childTnLst>
+                    </p:cTn>
+                  </p:par>
+                </p:childTnLst>
+              </p:cTn>
+              <p:nextCondLst>
+                <p:cond evt="onClick" delay="0">
+                  <p:tgtEl>
+                    <p:spTgt spid="7"/>
+                  </p:tgtEl>
+                </p:cond>
+              </p:nextCondLst>
+            </p:seq>
+            <p:audio>
+              <p:cMediaNode vol="80000">
+                <p:cTn id="7" fill="hold" display="0">
+                  <p:stCondLst>
+                    <p:cond delay="indefinite"/>
+                  </p:stCondLst>
+                  <p:endCondLst>
+                    <p:cond evt="onStopAudio" delay="0">
+                      <p:tgtEl>
+                        <p:sldTgt/>
+                      </p:tgtEl>
+                    </p:cond>
+                  </p:endCondLst>
+                </p:cTn>
+                <p:tgtEl>
+                  <p:spTgt spid="7"/>
+                </p:tgtEl>
+              </p:cMediaNode>
+            </p:audio>
+          </p:childTnLst>
+        </p:cTn>
+      </p:par>
+    </p:tnLst>
+  </p:timing>
 </p:sld>
 </file>
 
@@ -4412,7 +4680,7 @@
         </p:blipFill>
         <p:spPr>
           <a:xfrm>
-            <a:off x="2464967" y="3429000"/>
+            <a:off x="2464967" y="3224665"/>
             <a:ext cx="7262066" cy="776629"/>
           </a:xfrm>
           <a:prstGeom prst="rect">
@@ -4430,6 +4698,13 @@
   <p:clrMapOvr>
     <a:masterClrMapping/>
   </p:clrMapOvr>
+  <p:timing>
+    <p:tnLst>
+      <p:par>
+        <p:cTn id="1" dur="indefinite" restart="never" nodeType="tmRoot"/>
+      </p:par>
+    </p:tnLst>
+  </p:timing>
 </p:sld>
 </file>
 
@@ -4529,11 +4804,68 @@
             </a:r>
             <a:r>
               <a:rPr lang="en-US" i="1" dirty="0"/>
-              <a:t>s.</a:t>
-            </a:r>
+              <a:t>s</a:t>
+            </a:r>
+            <a:r>
+              <a:rPr lang="en-US" i="1" dirty="0" smtClean="0"/>
+              <a:t>.</a:t>
+            </a:r>
+          </a:p>
+          <a:p>
+            <a:r>
+              <a:rPr lang="en-US" dirty="0" smtClean="0"/>
+              <a:t>Without external or very little external information</a:t>
+            </a:r>
+          </a:p>
+          <a:p>
             <a:endParaRPr lang="en-US" dirty="0"/>
           </a:p>
           <a:p>
+            <a:r>
+              <a:rPr lang="en-US" b="1" dirty="0"/>
+              <a:t>A Compressed Sensing Approach to </a:t>
+            </a:r>
+            <a:r>
+              <a:rPr lang="en-US" b="1" dirty="0" smtClean="0"/>
+              <a:t>Blind Separation </a:t>
+            </a:r>
+            <a:r>
+              <a:rPr lang="en-US" b="1" dirty="0"/>
+              <a:t>of </a:t>
+            </a:r>
+            <a:r>
+              <a:rPr lang="en-US" b="1" dirty="0" smtClean="0"/>
+              <a:t>Speech Mixture </a:t>
+            </a:r>
+            <a:r>
+              <a:rPr lang="en-US" b="1" dirty="0"/>
+              <a:t>Based on </a:t>
+            </a:r>
+            <a:r>
+              <a:rPr lang="en-US" b="1" dirty="0" smtClean="0"/>
+              <a:t>a Two-Layer </a:t>
+            </a:r>
+            <a:r>
+              <a:rPr lang="en-US" b="1" dirty="0"/>
+              <a:t>Sparsity </a:t>
+            </a:r>
+            <a:r>
+              <a:rPr lang="en-US" b="1" dirty="0" smtClean="0"/>
+              <a:t>Model</a:t>
+            </a:r>
+          </a:p>
+          <a:p>
+            <a:pPr marL="457200" lvl="1" indent="0">
+              <a:buNone/>
+            </a:pPr>
+            <a:r>
+              <a:rPr lang="en-US" dirty="0" err="1" smtClean="0"/>
+              <a:t>Bao</a:t>
+            </a:r>
+            <a:r>
+              <a:rPr lang="en-US" dirty="0" smtClean="0"/>
+              <a:t>, Ye, Xu, Zhou, IEE Transactions on Audio, Speech, and Language Processing</a:t>
+            </a:r>
             <a:endParaRPr lang="en-US" dirty="0"/>
           </a:p>
         </p:txBody>
@@ -4584,38 +4916,8 @@
         </p:blipFill>
         <p:spPr>
           <a:xfrm>
-            <a:off x="735746" y="4964314"/>
+            <a:off x="4720088" y="5335522"/>
             <a:ext cx="2751823" cy="541464"/>
-          </a:xfrm>
-          <a:prstGeom prst="rect">
-            <a:avLst/>
-          </a:prstGeom>
-        </p:spPr>
-      </p:pic>
-      <p:pic>
-        <p:nvPicPr>
-          <p:cNvPr id="6" name="Picture 5"/>
-          <p:cNvPicPr>
-            <a:picLocks noChangeAspect="1"/>
-          </p:cNvPicPr>
-          <p:nvPr/>
-        </p:nvPicPr>
-        <p:blipFill>
-          <a:blip r:embed="rId3">
-            <a:extLst>
-              <a:ext uri="{28A0092B-C50C-407E-A947-70E740481C1C}">
-                <a14:useLocalDpi xmlns:a14="http://schemas.microsoft.com/office/drawing/2010/main" val="0"/>
-              </a:ext>
-            </a:extLst>
-          </a:blip>
-          <a:stretch>
-            <a:fillRect/>
-          </a:stretch>
-        </p:blipFill>
-        <p:spPr>
-          <a:xfrm>
-            <a:off x="5269614" y="4979365"/>
-            <a:ext cx="2660678" cy="511362"/>
           </a:xfrm>
           <a:prstGeom prst="rect">
             <a:avLst/>
@@ -4632,6 +4934,13 @@
   <p:clrMapOvr>
     <a:masterClrMapping/>
   </p:clrMapOvr>
+  <p:timing>
+    <p:tnLst>
+      <p:par>
+        <p:cTn id="1" dur="indefinite" restart="never" nodeType="tmRoot"/>
+      </p:par>
+    </p:tnLst>
+  </p:timing>
 </p:sld>
 </file>
 
@@ -4667,7 +4976,11 @@
           <a:bodyPr/>
           <a:lstStyle/>
           <a:p>
-            <a:endParaRPr lang="en-US"/>
+            <a:r>
+              <a:rPr lang="en-US" dirty="0" smtClean="0"/>
+              <a:t>Methodology</a:t>
+            </a:r>
+            <a:endParaRPr lang="en-US" dirty="0"/>
           </a:p>
         </p:txBody>
       </p:sp>
@@ -4697,7 +5010,7 @@
       </p:sp>
       <p:pic>
         <p:nvPicPr>
-          <p:cNvPr id="6" name="Picture 5"/>
+          <p:cNvPr id="5" name="Picture 4"/>
           <p:cNvPicPr>
             <a:picLocks noChangeAspect="1"/>
           </p:cNvPicPr>
@@ -4717,7 +5030,7 @@
         </p:blipFill>
         <p:spPr>
           <a:xfrm>
-            <a:off x="1134835" y="1825625"/>
+            <a:off x="3740541" y="1690688"/>
             <a:ext cx="4710917" cy="1304949"/>
           </a:xfrm>
           <a:prstGeom prst="rect">
@@ -4725,6 +5038,152 @@
           </a:prstGeom>
         </p:spPr>
       </p:pic>
+      <p:sp>
+        <p:nvSpPr>
+          <p:cNvPr id="6" name="Content Placeholder 2">
+            <a:extLst>
+              <a:ext uri="{FF2B5EF4-FFF2-40B4-BE49-F238E27FC236}">
+                <a16:creationId xmlns:a16="http://schemas.microsoft.com/office/drawing/2014/main" id="{7D4A5B65-93E4-4C20-8FDC-F743C77C91BF}"/>
+              </a:ext>
+            </a:extLst>
+          </p:cNvPr>
+          <p:cNvSpPr>
+            <a:spLocks noGrp="1"/>
+          </p:cNvSpPr>
+          <p:nvPr>
+            <p:ph idx="1"/>
+          </p:nvPr>
+        </p:nvSpPr>
+        <p:spPr>
+          <a:xfrm>
+            <a:off x="838199" y="3593431"/>
+            <a:ext cx="10327105" cy="2583531"/>
+          </a:xfrm>
+        </p:spPr>
+        <p:txBody>
+          <a:bodyPr/>
+          <a:lstStyle/>
+          <a:p>
+            <a:r>
+              <a:rPr lang="en-US" dirty="0" smtClean="0"/>
+              <a:t>Computing mixing matrix A</a:t>
+            </a:r>
+          </a:p>
+          <a:p>
+            <a:endParaRPr lang="en-US" dirty="0"/>
+          </a:p>
+        </p:txBody>
+      </p:sp>
+      <p:pic>
+        <p:nvPicPr>
+          <p:cNvPr id="7" name="Picture 6"/>
+          <p:cNvPicPr>
+            <a:picLocks noChangeAspect="1"/>
+          </p:cNvPicPr>
+          <p:nvPr/>
+        </p:nvPicPr>
+        <p:blipFill>
+          <a:blip r:embed="rId3">
+            <a:extLst>
+              <a:ext uri="{28A0092B-C50C-407E-A947-70E740481C1C}">
+                <a14:useLocalDpi xmlns:a14="http://schemas.microsoft.com/office/drawing/2010/main" val="0"/>
+              </a:ext>
+            </a:extLst>
+          </a:blip>
+          <a:stretch>
+            <a:fillRect/>
+          </a:stretch>
+        </p:blipFill>
+        <p:spPr>
+          <a:xfrm>
+            <a:off x="3368023" y="4463448"/>
+            <a:ext cx="5242577" cy="1402681"/>
+          </a:xfrm>
+          <a:prstGeom prst="rect">
+            <a:avLst/>
+          </a:prstGeom>
+        </p:spPr>
+      </p:pic>
+    </p:spTree>
+    <p:extLst>
+      <p:ext uri="{BB962C8B-B14F-4D97-AF65-F5344CB8AC3E}">
+        <p14:creationId xmlns:p14="http://schemas.microsoft.com/office/powerpoint/2010/main" val="3208385418"/>
+      </p:ext>
+    </p:extLst>
+  </p:cSld>
+  <p:clrMapOvr>
+    <a:masterClrMapping/>
+  </p:clrMapOvr>
+  <p:timing>
+    <p:tnLst>
+      <p:par>
+        <p:cTn id="1" dur="indefinite" restart="never" nodeType="tmRoot"/>
+      </p:par>
+    </p:tnLst>
+  </p:timing>
+</p:sld>
+</file>
+
+<file path=ppt/slides/slide8.xml><?xml version="1.0" encoding="utf-8"?>
+<p:sld xmlns:a="http://schemas.openxmlformats.org/drawingml/2006/main" xmlns:r="http://schemas.openxmlformats.org/officeDocument/2006/relationships" xmlns:p="http://schemas.openxmlformats.org/presentationml/2006/main">
+  <p:cSld>
+    <p:spTree>
+      <p:nvGrpSpPr>
+        <p:cNvPr id="1" name=""/>
+        <p:cNvGrpSpPr/>
+        <p:nvPr/>
+      </p:nvGrpSpPr>
+      <p:grpSpPr>
+        <a:xfrm>
+          <a:off x="0" y="0"/>
+          <a:ext cx="0" cy="0"/>
+          <a:chOff x="0" y="0"/>
+          <a:chExt cx="0" cy="0"/>
+        </a:xfrm>
+      </p:grpSpPr>
+      <p:sp>
+        <p:nvSpPr>
+          <p:cNvPr id="2" name="Title 1"/>
+          <p:cNvSpPr>
+            <a:spLocks noGrp="1"/>
+          </p:cNvSpPr>
+          <p:nvPr>
+            <p:ph type="title"/>
+          </p:nvPr>
+        </p:nvSpPr>
+        <p:spPr/>
+        <p:txBody>
+          <a:bodyPr/>
+          <a:lstStyle/>
+          <a:p>
+            <a:endParaRPr lang="en-US" dirty="0"/>
+          </a:p>
+        </p:txBody>
+      </p:sp>
+      <p:sp>
+        <p:nvSpPr>
+          <p:cNvPr id="4" name="Slide Number Placeholder 3"/>
+          <p:cNvSpPr>
+            <a:spLocks noGrp="1"/>
+          </p:cNvSpPr>
+          <p:nvPr>
+            <p:ph type="sldNum" sz="quarter" idx="12"/>
+          </p:nvPr>
+        </p:nvSpPr>
+        <p:spPr/>
+        <p:txBody>
+          <a:bodyPr/>
+          <a:lstStyle/>
+          <a:p>
+            <a:fld id="{0D14E344-43A7-4D61-B7CB-7B7571C47B84}" type="slidenum">
+              <a:rPr lang="en-US" smtClean="0"/>
+              <a:pPr/>
+              <a:t>8</a:t>
+            </a:fld>
+            <a:endParaRPr lang="en-US" dirty="0"/>
+          </a:p>
+        </p:txBody>
+      </p:sp>
       <p:pic>
         <p:nvPicPr>
           <p:cNvPr id="9" name="Picture 8"/>
@@ -4734,7 +5193,7 @@
           <p:nvPr/>
         </p:nvPicPr>
         <p:blipFill>
-          <a:blip r:embed="rId3">
+          <a:blip r:embed="rId2">
             <a:extLst>
               <a:ext uri="{28A0092B-C50C-407E-A947-70E740481C1C}">
                 <a14:useLocalDpi xmlns:a14="http://schemas.microsoft.com/office/drawing/2010/main" val="0"/>
@@ -4764,7 +5223,7 @@
           <p:nvPr/>
         </p:nvPicPr>
         <p:blipFill>
-          <a:blip r:embed="rId4">
+          <a:blip r:embed="rId3">
             <a:extLst>
               <a:ext uri="{28A0092B-C50C-407E-A947-70E740481C1C}">
                 <a14:useLocalDpi xmlns:a14="http://schemas.microsoft.com/office/drawing/2010/main" val="0"/>
@@ -4794,7 +5253,7 @@
           <p:nvPr/>
         </p:nvPicPr>
         <p:blipFill>
-          <a:blip r:embed="rId5">
+          <a:blip r:embed="rId4">
             <a:extLst>
               <a:ext uri="{28A0092B-C50C-407E-A947-70E740481C1C}">
                 <a14:useLocalDpi xmlns:a14="http://schemas.microsoft.com/office/drawing/2010/main" val="0"/>
@@ -4828,208 +5287,6 @@
 </p:sld>
 </file>
 
-<file path=ppt/slides/slide8.xml><?xml version="1.0" encoding="utf-8"?>
-<p:sld xmlns:a="http://schemas.openxmlformats.org/drawingml/2006/main" xmlns:r="http://schemas.openxmlformats.org/officeDocument/2006/relationships" xmlns:p="http://schemas.openxmlformats.org/presentationml/2006/main">
-  <p:cSld>
-    <p:spTree>
-      <p:nvGrpSpPr>
-        <p:cNvPr id="1" name=""/>
-        <p:cNvGrpSpPr/>
-        <p:nvPr/>
-      </p:nvGrpSpPr>
-      <p:grpSpPr>
-        <a:xfrm>
-          <a:off x="0" y="0"/>
-          <a:ext cx="0" cy="0"/>
-          <a:chOff x="0" y="0"/>
-          <a:chExt cx="0" cy="0"/>
-        </a:xfrm>
-      </p:grpSpPr>
-      <p:sp>
-        <p:nvSpPr>
-          <p:cNvPr id="2" name="Title 1">
-            <a:extLst>
-              <a:ext uri="{FF2B5EF4-FFF2-40B4-BE49-F238E27FC236}">
-                <a16:creationId xmlns:a16="http://schemas.microsoft.com/office/drawing/2014/main" id="{E440053D-501A-495F-ADDB-4A2E3291553C}"/>
-              </a:ext>
-            </a:extLst>
-          </p:cNvPr>
-          <p:cNvSpPr>
-            <a:spLocks noGrp="1"/>
-          </p:cNvSpPr>
-          <p:nvPr>
-            <p:ph type="title"/>
-          </p:nvPr>
-        </p:nvSpPr>
-        <p:spPr/>
-        <p:txBody>
-          <a:bodyPr/>
-          <a:lstStyle/>
-          <a:p>
-            <a:r>
-              <a:rPr lang="en-US" dirty="0"/>
-              <a:t>Our Approach: Independent Component Analysis</a:t>
-            </a:r>
-          </a:p>
-        </p:txBody>
-      </p:sp>
-      <p:sp>
-        <p:nvSpPr>
-          <p:cNvPr id="3" name="Content Placeholder 2">
-            <a:extLst>
-              <a:ext uri="{FF2B5EF4-FFF2-40B4-BE49-F238E27FC236}">
-                <a16:creationId xmlns:a16="http://schemas.microsoft.com/office/drawing/2014/main" id="{7D4A5B65-93E4-4C20-8FDC-F743C77C91BF}"/>
-              </a:ext>
-            </a:extLst>
-          </p:cNvPr>
-          <p:cNvSpPr>
-            <a:spLocks noGrp="1"/>
-          </p:cNvSpPr>
-          <p:nvPr>
-            <p:ph idx="1"/>
-          </p:nvPr>
-        </p:nvSpPr>
-        <p:spPr>
-          <a:xfrm>
-            <a:off x="838200" y="1511449"/>
-            <a:ext cx="5024718" cy="4665514"/>
-          </a:xfrm>
-        </p:spPr>
-        <p:txBody>
-          <a:bodyPr/>
-          <a:lstStyle/>
-          <a:p>
-            <a:r>
-              <a:rPr lang="en-US" dirty="0"/>
-              <a:t>ICA to find M:</a:t>
-            </a:r>
-          </a:p>
-          <a:p>
-            <a:pPr lvl="1"/>
-            <a:r>
-              <a:rPr lang="en-US" dirty="0"/>
-              <a:t>Compute STFT of </a:t>
-            </a:r>
-            <a:r>
-              <a:rPr lang="en-US" i="1" dirty="0"/>
-              <a:t>s </a:t>
-            </a:r>
-            <a:r>
-              <a:rPr lang="en-US" dirty="0"/>
-              <a:t>to obtain the time-frequency domain of </a:t>
-            </a:r>
-            <a:r>
-              <a:rPr lang="en-US" i="1" dirty="0"/>
-              <a:t>s</a:t>
-            </a:r>
-            <a:r>
-              <a:rPr lang="en-US" dirty="0"/>
-              <a:t>.</a:t>
-            </a:r>
-          </a:p>
-          <a:p>
-            <a:pPr lvl="1"/>
-            <a:r>
-              <a:rPr lang="en-US" dirty="0"/>
-              <a:t>Cluster the columns of the STFT to obtain the columns of the mixing dictionary, M.</a:t>
-            </a:r>
-          </a:p>
-        </p:txBody>
-      </p:sp>
-      <p:pic>
-        <p:nvPicPr>
-          <p:cNvPr id="5" name="Picture 4"/>
-          <p:cNvPicPr>
-            <a:picLocks noChangeAspect="1"/>
-          </p:cNvPicPr>
-          <p:nvPr/>
-        </p:nvPicPr>
-        <p:blipFill>
-          <a:blip r:embed="rId2"/>
-          <a:stretch>
-            <a:fillRect/>
-          </a:stretch>
-        </p:blipFill>
-        <p:spPr>
-          <a:xfrm>
-            <a:off x="6441141" y="1417720"/>
-            <a:ext cx="4338918" cy="4669550"/>
-          </a:xfrm>
-          <a:prstGeom prst="rect">
-            <a:avLst/>
-          </a:prstGeom>
-        </p:spPr>
-      </p:pic>
-      <p:sp>
-        <p:nvSpPr>
-          <p:cNvPr id="6" name="TextBox 5"/>
-          <p:cNvSpPr txBox="1"/>
-          <p:nvPr/>
-        </p:nvSpPr>
-        <p:spPr>
-          <a:xfrm>
-            <a:off x="6238875" y="6157521"/>
-            <a:ext cx="4743450" cy="246221"/>
-          </a:xfrm>
-          <a:prstGeom prst="rect">
-            <a:avLst/>
-          </a:prstGeom>
-          <a:noFill/>
-        </p:spPr>
-        <p:txBody>
-          <a:bodyPr wrap="square" rtlCol="0">
-            <a:spAutoFit/>
-          </a:bodyPr>
-          <a:lstStyle/>
-          <a:p>
-            <a:r>
-              <a:rPr lang="en-US" sz="1000" dirty="0" err="1"/>
-              <a:t>Bao</a:t>
-            </a:r>
-            <a:r>
-              <a:rPr lang="en-US" sz="1000" dirty="0"/>
-              <a:t> G, Ye Z, Xu X, Zhou Y. IEE Transactions on Audio, Speech, and Language Processing </a:t>
-            </a:r>
-          </a:p>
-        </p:txBody>
-      </p:sp>
-      <p:sp>
-        <p:nvSpPr>
-          <p:cNvPr id="7" name="Slide Number Placeholder 6"/>
-          <p:cNvSpPr>
-            <a:spLocks noGrp="1"/>
-          </p:cNvSpPr>
-          <p:nvPr>
-            <p:ph type="sldNum" sz="quarter" idx="12"/>
-          </p:nvPr>
-        </p:nvSpPr>
-        <p:spPr/>
-        <p:txBody>
-          <a:bodyPr/>
-          <a:lstStyle/>
-          <a:p>
-            <a:fld id="{0D14E344-43A7-4D61-B7CB-7B7571C47B84}" type="slidenum">
-              <a:rPr lang="en-US" smtClean="0"/>
-              <a:pPr/>
-              <a:t>8</a:t>
-            </a:fld>
-            <a:endParaRPr lang="en-US" dirty="0"/>
-          </a:p>
-        </p:txBody>
-      </p:sp>
-    </p:spTree>
-    <p:extLst>
-      <p:ext uri="{BB962C8B-B14F-4D97-AF65-F5344CB8AC3E}">
-        <p14:creationId xmlns:p14="http://schemas.microsoft.com/office/powerpoint/2010/main" val="1723405738"/>
-      </p:ext>
-    </p:extLst>
-  </p:cSld>
-  <p:clrMapOvr>
-    <a:masterClrMapping/>
-  </p:clrMapOvr>
-</p:sld>
-</file>
-
 <file path=ppt/slides/slide9.xml><?xml version="1.0" encoding="utf-8"?>
 <p:sld xmlns:a="http://schemas.openxmlformats.org/drawingml/2006/main" xmlns:r="http://schemas.openxmlformats.org/officeDocument/2006/relationships" xmlns:p="http://schemas.openxmlformats.org/presentationml/2006/main">
   <p:cSld>
@@ -5052,7 +5309,7 @@
           <p:cNvPr id="2" name="Title 1">
             <a:extLst>
               <a:ext uri="{FF2B5EF4-FFF2-40B4-BE49-F238E27FC236}">
-                <a16:creationId xmlns:a16="http://schemas.microsoft.com/office/drawing/2014/main" id="{9C3895C8-84E8-490E-814D-7FD942AA0250}"/>
+                <a16:creationId xmlns:a16="http://schemas.microsoft.com/office/drawing/2014/main" id="{E440053D-501A-495F-ADDB-4A2E3291553C}"/>
               </a:ext>
             </a:extLst>
           </p:cNvPr>
@@ -5069,10 +5326,9 @@
           <a:lstStyle/>
           <a:p>
             <a:r>
-              <a:rPr lang="en-US" dirty="0" err="1"/>
-              <a:t>Smashmouth</a:t>
-            </a:r>
-            <a:endParaRPr lang="en-US" dirty="0"/>
+              <a:rPr lang="en-US" dirty="0"/>
+              <a:t>Our Approach: Independent Component Analysis</a:t>
+            </a:r>
           </a:p>
         </p:txBody>
       </p:sp>
@@ -5081,7 +5337,7 @@
           <p:cNvPr id="3" name="Content Placeholder 2">
             <a:extLst>
               <a:ext uri="{FF2B5EF4-FFF2-40B4-BE49-F238E27FC236}">
-                <a16:creationId xmlns:a16="http://schemas.microsoft.com/office/drawing/2014/main" id="{ADA04467-F10A-443F-ACA2-CDE3E1035B6B}"/>
+                <a16:creationId xmlns:a16="http://schemas.microsoft.com/office/drawing/2014/main" id="{7D4A5B65-93E4-4C20-8FDC-F743C77C91BF}"/>
               </a:ext>
             </a:extLst>
           </p:cNvPr>
@@ -5092,27 +5348,94 @@
             <p:ph idx="1"/>
           </p:nvPr>
         </p:nvSpPr>
-        <p:spPr/>
+        <p:spPr>
+          <a:xfrm>
+            <a:off x="838200" y="1511449"/>
+            <a:ext cx="5024718" cy="4665514"/>
+          </a:xfrm>
+        </p:spPr>
         <p:txBody>
           <a:bodyPr/>
           <a:lstStyle/>
           <a:p>
             <a:r>
               <a:rPr lang="en-US" dirty="0"/>
-              <a:t>Question?</a:t>
-            </a:r>
-          </a:p>
-        </p:txBody>
-      </p:sp>
-      <p:sp>
-        <p:nvSpPr>
-          <p:cNvPr id="4" name="Slide Number Placeholder 3">
-            <a:extLst>
-              <a:ext uri="{FF2B5EF4-FFF2-40B4-BE49-F238E27FC236}">
-                <a16:creationId xmlns:a16="http://schemas.microsoft.com/office/drawing/2014/main" id="{EAA9769B-1222-49B8-BE31-76E5CC92B8A7}"/>
-              </a:ext>
-            </a:extLst>
-          </p:cNvPr>
+              <a:t>ICA to find M:</a:t>
+            </a:r>
+          </a:p>
+          <a:p>
+            <a:pPr lvl="1"/>
+            <a:r>
+              <a:rPr lang="en-US" dirty="0"/>
+              <a:t>Compute STFT of </a:t>
+            </a:r>
+            <a:r>
+              <a:rPr lang="en-US" i="1" dirty="0"/>
+              <a:t>s </a:t>
+            </a:r>
+            <a:r>
+              <a:rPr lang="en-US" dirty="0"/>
+              <a:t>to obtain the time-frequency domain of </a:t>
+            </a:r>
+            <a:r>
+              <a:rPr lang="en-US" i="1" dirty="0"/>
+              <a:t>s</a:t>
+            </a:r>
+            <a:r>
+              <a:rPr lang="en-US" dirty="0"/>
+              <a:t>.</a:t>
+            </a:r>
+          </a:p>
+          <a:p>
+            <a:pPr lvl="1"/>
+            <a:r>
+              <a:rPr lang="en-US" dirty="0"/>
+              <a:t>Cluster the columns of the STFT to obtain the columns of the mixing dictionary, M.</a:t>
+            </a:r>
+          </a:p>
+        </p:txBody>
+      </p:sp>
+      <p:sp>
+        <p:nvSpPr>
+          <p:cNvPr id="6" name="TextBox 5"/>
+          <p:cNvSpPr txBox="1"/>
+          <p:nvPr/>
+        </p:nvSpPr>
+        <p:spPr>
+          <a:xfrm>
+            <a:off x="6238875" y="6157521"/>
+            <a:ext cx="4743450" cy="246221"/>
+          </a:xfrm>
+          <a:prstGeom prst="rect">
+            <a:avLst/>
+          </a:prstGeom>
+          <a:noFill/>
+        </p:spPr>
+        <p:txBody>
+          <a:bodyPr wrap="square" rtlCol="0">
+            <a:spAutoFit/>
+          </a:bodyPr>
+          <a:lstStyle/>
+          <a:p>
+            <a:r>
+              <a:rPr lang="en-US" sz="1000" dirty="0" smtClean="0"/>
+              <a:t>Xu T, Wang W</a:t>
+            </a:r>
+            <a:r>
+              <a:rPr lang="en-US" sz="1000" dirty="0" smtClean="0"/>
+              <a:t>. </a:t>
+            </a:r>
+            <a:r>
+              <a:rPr lang="en-US" sz="1000" dirty="0" smtClean="0"/>
+              <a:t>IEE Workshop on Statistical Signal Processing</a:t>
+            </a:r>
+            <a:endParaRPr lang="en-US" sz="1000" dirty="0"/>
+          </a:p>
+        </p:txBody>
+      </p:sp>
+      <p:sp>
+        <p:nvSpPr>
+          <p:cNvPr id="7" name="Slide Number Placeholder 6"/>
           <p:cNvSpPr>
             <a:spLocks noGrp="1"/>
           </p:cNvSpPr>
@@ -5134,10 +5457,152 @@
           </a:p>
         </p:txBody>
       </p:sp>
+      <p:grpSp>
+        <p:nvGrpSpPr>
+          <p:cNvPr id="10" name="Group 9"/>
+          <p:cNvGrpSpPr/>
+          <p:nvPr/>
+        </p:nvGrpSpPr>
+        <p:grpSpPr>
+          <a:xfrm>
+            <a:off x="6335378" y="1372451"/>
+            <a:ext cx="3208421" cy="4804512"/>
+            <a:chOff x="6484553" y="914181"/>
+            <a:chExt cx="3750310" cy="5442169"/>
+          </a:xfrm>
+        </p:grpSpPr>
+        <p:pic>
+          <p:nvPicPr>
+            <p:cNvPr id="8" name="Picture 7"/>
+            <p:cNvPicPr>
+              <a:picLocks noChangeAspect="1"/>
+            </p:cNvPicPr>
+            <p:nvPr/>
+          </p:nvPicPr>
+          <p:blipFill>
+            <a:blip r:embed="rId2"/>
+            <a:stretch>
+              <a:fillRect/>
+            </a:stretch>
+          </p:blipFill>
+          <p:spPr>
+            <a:xfrm>
+              <a:off x="6484553" y="914181"/>
+              <a:ext cx="3750310" cy="2767186"/>
+            </a:xfrm>
+            <a:prstGeom prst="rect">
+              <a:avLst/>
+            </a:prstGeom>
+          </p:spPr>
+        </p:pic>
+        <p:pic>
+          <p:nvPicPr>
+            <p:cNvPr id="9" name="Picture 8"/>
+            <p:cNvPicPr>
+              <a:picLocks noChangeAspect="1"/>
+            </p:cNvPicPr>
+            <p:nvPr/>
+          </p:nvPicPr>
+          <p:blipFill>
+            <a:blip r:embed="rId3"/>
+            <a:stretch>
+              <a:fillRect/>
+            </a:stretch>
+          </p:blipFill>
+          <p:spPr>
+            <a:xfrm>
+              <a:off x="6484554" y="3613893"/>
+              <a:ext cx="3750309" cy="2742457"/>
+            </a:xfrm>
+            <a:prstGeom prst="rect">
+              <a:avLst/>
+            </a:prstGeom>
+          </p:spPr>
+        </p:pic>
+      </p:grpSp>
+      <p:sp>
+        <p:nvSpPr>
+          <p:cNvPr id="11" name="TextBox 10"/>
+          <p:cNvSpPr txBox="1"/>
+          <p:nvPr/>
+        </p:nvSpPr>
+        <p:spPr>
+          <a:xfrm>
+            <a:off x="9543799" y="1485340"/>
+            <a:ext cx="1727284" cy="2862322"/>
+          </a:xfrm>
+          <a:prstGeom prst="rect">
+            <a:avLst/>
+          </a:prstGeom>
+          <a:noFill/>
+        </p:spPr>
+        <p:txBody>
+          <a:bodyPr wrap="square" rtlCol="0">
+            <a:spAutoFit/>
+          </a:bodyPr>
+          <a:lstStyle/>
+          <a:p>
+            <a:pPr marL="342900" indent="-342900">
+              <a:buAutoNum type="alphaLcParenBoth"/>
+            </a:pPr>
+            <a:r>
+              <a:rPr lang="en-US" dirty="0" smtClean="0"/>
+              <a:t>Time domain</a:t>
+            </a:r>
+            <a:endParaRPr lang="en-US" dirty="0"/>
+          </a:p>
+          <a:p>
+            <a:pPr marL="342900" indent="-342900">
+              <a:buAutoNum type="alphaLcParenBoth"/>
+            </a:pPr>
+            <a:endParaRPr lang="en-US" dirty="0" smtClean="0"/>
+          </a:p>
+          <a:p>
+            <a:pPr marL="342900" indent="-342900">
+              <a:buAutoNum type="alphaLcParenBoth"/>
+            </a:pPr>
+            <a:endParaRPr lang="en-US" dirty="0"/>
+          </a:p>
+          <a:p>
+            <a:pPr marL="342900" indent="-342900">
+              <a:buAutoNum type="alphaLcParenBoth"/>
+            </a:pPr>
+            <a:endParaRPr lang="en-US" dirty="0" smtClean="0"/>
+          </a:p>
+          <a:p>
+            <a:pPr marL="342900" indent="-342900">
+              <a:buAutoNum type="alphaLcParenBoth"/>
+            </a:pPr>
+            <a:endParaRPr lang="en-US" dirty="0"/>
+          </a:p>
+          <a:p>
+            <a:pPr marL="342900" indent="-342900">
+              <a:buAutoNum type="alphaLcParenBoth"/>
+            </a:pPr>
+            <a:endParaRPr lang="en-US" dirty="0" smtClean="0"/>
+          </a:p>
+          <a:p>
+            <a:pPr marL="342900" indent="-342900">
+              <a:buAutoNum type="alphaLcParenBoth"/>
+            </a:pPr>
+            <a:endParaRPr lang="en-US" dirty="0"/>
+          </a:p>
+          <a:p>
+            <a:pPr marL="342900" indent="-342900">
+              <a:buAutoNum type="alphaLcParenBoth"/>
+            </a:pPr>
+            <a:r>
+              <a:rPr lang="en-US" dirty="0" smtClean="0"/>
+              <a:t>Frequency domain</a:t>
+            </a:r>
+            <a:endParaRPr lang="en-US" dirty="0"/>
+          </a:p>
+        </p:txBody>
+      </p:sp>
     </p:spTree>
     <p:extLst>
       <p:ext uri="{BB962C8B-B14F-4D97-AF65-F5344CB8AC3E}">
-        <p14:creationId xmlns:p14="http://schemas.microsoft.com/office/powerpoint/2010/main" val="781660832"/>
+        <p14:creationId xmlns:p14="http://schemas.microsoft.com/office/powerpoint/2010/main" val="1723405738"/>
       </p:ext>
     </p:extLst>
   </p:cSld>

</xml_diff>